<commit_message>
add list of current stock resource
</commit_message>
<xml_diff>
--- a/src/app/view/resource_png/자판기 리소스.pptx
+++ b/src/app/view/resource_png/자판기 리소스.pptx
@@ -5,7 +5,7 @@
     <p:sldMasterId id="2147483659" r:id="rId1"/>
   </p:sldMasterIdLst>
   <p:notesMasterIdLst>
-    <p:notesMasterId r:id="rId35"/>
+    <p:notesMasterId r:id="rId36"/>
   </p:notesMasterIdLst>
   <p:sldIdLst>
     <p:sldId id="256" r:id="rId2"/>
@@ -39,8 +39,9 @@
     <p:sldId id="283" r:id="rId30"/>
     <p:sldId id="284" r:id="rId31"/>
     <p:sldId id="293" r:id="rId32"/>
-    <p:sldId id="294" r:id="rId33"/>
-    <p:sldId id="295" r:id="rId34"/>
+    <p:sldId id="297" r:id="rId33"/>
+    <p:sldId id="294" r:id="rId34"/>
+    <p:sldId id="295" r:id="rId35"/>
   </p:sldIdLst>
   <p:sldSz cx="14630400" cy="9144000"/>
   <p:notesSz cx="6858000" cy="9144000"/>
@@ -308,85 +309,9 @@
     <p1510:client id="{31540B99-5F33-4D7C-87E8-AC5668DEB7F9}" v="8" dt="2022-10-24T10:15:59.149"/>
     <p1510:client id="{57A35B25-FAB7-49A4-BC31-E40B12A2DB4D}" v="13" dt="2022-11-22T14:22:48.578"/>
     <p1510:client id="{742615F6-08A9-45A9-B8EE-A1DC7C4ABCDD}" v="8" dt="2022-11-22T14:15:16.997"/>
+    <p1510:client id="{AC7E113E-F91C-4A47-B77B-6335FB44354D}" v="152" dt="2022-12-05T10:19:04.206"/>
   </p1510:revLst>
 </p1510:revInfo>
-</file>
-
-<file path=ppt/changesInfos/changesInfo1.xml><?xml version="1.0" encoding="utf-8"?>
-<pc:chgInfo xmlns:a="http://schemas.openxmlformats.org/drawingml/2006/main" xmlns:r="http://schemas.openxmlformats.org/officeDocument/2006/relationships" xmlns:ac="http://schemas.microsoft.com/office/drawing/2013/main/command" xmlns:pc="http://schemas.microsoft.com/office/powerpoint/2013/main/command">
-  <pc:docChgLst>
-    <pc:chgData name="우 인명" userId="d4712c8aaaaa5725" providerId="Windows Live" clId="Web-{31540B99-5F33-4D7C-87E8-AC5668DEB7F9}"/>
-    <pc:docChg chg="modSld">
-      <pc:chgData name="우 인명" userId="d4712c8aaaaa5725" providerId="Windows Live" clId="Web-{31540B99-5F33-4D7C-87E8-AC5668DEB7F9}" dt="2022-10-24T10:15:58.884" v="5" actId="20577"/>
-      <pc:docMkLst>
-        <pc:docMk/>
-      </pc:docMkLst>
-      <pc:sldChg chg="modSp">
-        <pc:chgData name="우 인명" userId="d4712c8aaaaa5725" providerId="Windows Live" clId="Web-{31540B99-5F33-4D7C-87E8-AC5668DEB7F9}" dt="2022-10-24T10:15:58.884" v="5" actId="20577"/>
-        <pc:sldMkLst>
-          <pc:docMk/>
-          <pc:sldMk cId="0" sldId="266"/>
-        </pc:sldMkLst>
-        <pc:spChg chg="mod">
-          <ac:chgData name="우 인명" userId="d4712c8aaaaa5725" providerId="Windows Live" clId="Web-{31540B99-5F33-4D7C-87E8-AC5668DEB7F9}" dt="2022-10-24T10:15:58.884" v="5" actId="20577"/>
-          <ac:spMkLst>
-            <pc:docMk/>
-            <pc:sldMk cId="0" sldId="266"/>
-            <ac:spMk id="104" creationId="{00000000-0000-0000-0000-000000000000}"/>
-          </ac:spMkLst>
-        </pc:spChg>
-      </pc:sldChg>
-    </pc:docChg>
-  </pc:docChgLst>
-  <pc:docChgLst>
-    <pc:chgData name="우 인명" userId="d4712c8aaaaa5725" providerId="Windows Live" clId="Web-{742615F6-08A9-45A9-B8EE-A1DC7C4ABCDD}"/>
-    <pc:docChg chg="modSld">
-      <pc:chgData name="우 인명" userId="d4712c8aaaaa5725" providerId="Windows Live" clId="Web-{742615F6-08A9-45A9-B8EE-A1DC7C4ABCDD}" dt="2022-11-22T14:15:16.997" v="7" actId="20577"/>
-      <pc:docMkLst>
-        <pc:docMk/>
-      </pc:docMkLst>
-      <pc:sldChg chg="modSp">
-        <pc:chgData name="우 인명" userId="d4712c8aaaaa5725" providerId="Windows Live" clId="Web-{742615F6-08A9-45A9-B8EE-A1DC7C4ABCDD}" dt="2022-11-22T14:15:16.997" v="7" actId="20577"/>
-        <pc:sldMkLst>
-          <pc:docMk/>
-          <pc:sldMk cId="0" sldId="260"/>
-        </pc:sldMkLst>
-        <pc:spChg chg="mod">
-          <ac:chgData name="우 인명" userId="d4712c8aaaaa5725" providerId="Windows Live" clId="Web-{742615F6-08A9-45A9-B8EE-A1DC7C4ABCDD}" dt="2022-11-22T14:15:16.997" v="7" actId="20577"/>
-          <ac:spMkLst>
-            <pc:docMk/>
-            <pc:sldMk cId="0" sldId="260"/>
-            <ac:spMk id="74" creationId="{00000000-0000-0000-0000-000000000000}"/>
-          </ac:spMkLst>
-        </pc:spChg>
-      </pc:sldChg>
-    </pc:docChg>
-  </pc:docChgLst>
-  <pc:docChgLst>
-    <pc:chgData name="우 인명" userId="d4712c8aaaaa5725" providerId="Windows Live" clId="Web-{57A35B25-FAB7-49A4-BC31-E40B12A2DB4D}"/>
-    <pc:docChg chg="modSld">
-      <pc:chgData name="우 인명" userId="d4712c8aaaaa5725" providerId="Windows Live" clId="Web-{57A35B25-FAB7-49A4-BC31-E40B12A2DB4D}" dt="2022-11-22T14:22:48.578" v="12" actId="20577"/>
-      <pc:docMkLst>
-        <pc:docMk/>
-      </pc:docMkLst>
-      <pc:sldChg chg="modSp">
-        <pc:chgData name="우 인명" userId="d4712c8aaaaa5725" providerId="Windows Live" clId="Web-{57A35B25-FAB7-49A4-BC31-E40B12A2DB4D}" dt="2022-11-22T14:22:48.578" v="12" actId="20577"/>
-        <pc:sldMkLst>
-          <pc:docMk/>
-          <pc:sldMk cId="0" sldId="260"/>
-        </pc:sldMkLst>
-        <pc:spChg chg="mod">
-          <ac:chgData name="우 인명" userId="d4712c8aaaaa5725" providerId="Windows Live" clId="Web-{57A35B25-FAB7-49A4-BC31-E40B12A2DB4D}" dt="2022-11-22T14:22:48.578" v="12" actId="20577"/>
-          <ac:spMkLst>
-            <pc:docMk/>
-            <pc:sldMk cId="0" sldId="260"/>
-            <ac:spMk id="74" creationId="{00000000-0000-0000-0000-000000000000}"/>
-          </ac:spMkLst>
-        </pc:spChg>
-      </pc:sldChg>
-    </pc:docChg>
-  </pc:docChgLst>
-</pc:chgInfo>
 </file>
 
 <file path=ppt/notesMasters/notesMaster1.xml><?xml version="1.0" encoding="utf-8"?>
@@ -3445,6 +3370,115 @@
   <p:cSld>
     <p:spTree>
       <p:nvGrpSpPr>
+        <p:cNvPr id="1" name="Shape 196"/>
+        <p:cNvGrpSpPr/>
+        <p:nvPr/>
+      </p:nvGrpSpPr>
+      <p:grpSpPr>
+        <a:xfrm>
+          <a:off x="0" y="0"/>
+          <a:ext cx="0" cy="0"/>
+          <a:chOff x="0" y="0"/>
+          <a:chExt cx="0" cy="0"/>
+        </a:xfrm>
+      </p:grpSpPr>
+      <p:sp>
+        <p:nvSpPr>
+          <p:cNvPr id="197" name="Google Shape;197;g171669efe2c_0_135:notes"/>
+          <p:cNvSpPr>
+            <a:spLocks noGrp="1" noRot="1" noChangeAspect="1"/>
+          </p:cNvSpPr>
+          <p:nvPr>
+            <p:ph type="sldImg" idx="2"/>
+          </p:nvPr>
+        </p:nvSpPr>
+        <p:spPr>
+          <a:xfrm>
+            <a:off x="685800" y="685800"/>
+            <a:ext cx="5486400" cy="3429000"/>
+          </a:xfrm>
+          <a:custGeom>
+            <a:avLst/>
+            <a:gdLst/>
+            <a:ahLst/>
+            <a:cxnLst/>
+            <a:rect l="l" t="t" r="r" b="b"/>
+            <a:pathLst>
+              <a:path w="120000" h="120000" extrusionOk="0">
+                <a:moveTo>
+                  <a:pt x="0" y="0"/>
+                </a:moveTo>
+                <a:lnTo>
+                  <a:pt x="120000" y="0"/>
+                </a:lnTo>
+                <a:lnTo>
+                  <a:pt x="120000" y="120000"/>
+                </a:lnTo>
+                <a:lnTo>
+                  <a:pt x="0" y="120000"/>
+                </a:lnTo>
+                <a:close/>
+              </a:path>
+            </a:pathLst>
+          </a:custGeom>
+        </p:spPr>
+      </p:sp>
+      <p:sp>
+        <p:nvSpPr>
+          <p:cNvPr id="198" name="Google Shape;198;g171669efe2c_0_135:notes"/>
+          <p:cNvSpPr txBox="1">
+            <a:spLocks noGrp="1"/>
+          </p:cNvSpPr>
+          <p:nvPr>
+            <p:ph type="body" idx="1"/>
+          </p:nvPr>
+        </p:nvSpPr>
+        <p:spPr>
+          <a:xfrm>
+            <a:off x="685800" y="4343400"/>
+            <a:ext cx="5486400" cy="4114800"/>
+          </a:xfrm>
+          <a:prstGeom prst="rect">
+            <a:avLst/>
+          </a:prstGeom>
+        </p:spPr>
+        <p:txBody>
+          <a:bodyPr spcFirstLastPara="1" wrap="square" lIns="91425" tIns="91425" rIns="91425" bIns="91425" anchor="t" anchorCtr="0">
+            <a:noAutofit/>
+          </a:bodyPr>
+          <a:lstStyle/>
+          <a:p>
+            <a:pPr marL="0" lvl="0" indent="0" algn="l" rtl="0">
+              <a:spcBef>
+                <a:spcPts val="0"/>
+              </a:spcBef>
+              <a:spcAft>
+                <a:spcPts val="0"/>
+              </a:spcAft>
+              <a:buNone/>
+            </a:pPr>
+            <a:endParaRPr dirty="0"/>
+          </a:p>
+        </p:txBody>
+      </p:sp>
+    </p:spTree>
+    <p:extLst>
+      <p:ext uri="{BB962C8B-B14F-4D97-AF65-F5344CB8AC3E}">
+        <p14:creationId xmlns:p14="http://schemas.microsoft.com/office/powerpoint/2010/main" val="2311282723"/>
+      </p:ext>
+    </p:extLst>
+  </p:cSld>
+  <p:clrMapOvr>
+    <a:masterClrMapping/>
+  </p:clrMapOvr>
+</p:notes>
+</file>
+
+<file path=ppt/notesSlides/notesSlide33.xml><?xml version="1.0" encoding="utf-8"?>
+<p:notes xmlns:a="http://schemas.openxmlformats.org/drawingml/2006/main" xmlns:r="http://schemas.openxmlformats.org/officeDocument/2006/relationships" xmlns:p="http://schemas.openxmlformats.org/presentationml/2006/main" showMasterSp="0" showMasterPhAnim="0">
+  <p:cSld>
+    <p:spTree>
+      <p:nvGrpSpPr>
         <p:cNvPr id="1" name="Shape 170"/>
         <p:cNvGrpSpPr/>
         <p:nvPr/>
@@ -3549,7 +3583,7 @@
 </p:notes>
 </file>
 
-<file path=ppt/notesSlides/notesSlide33.xml><?xml version="1.0" encoding="utf-8"?>
+<file path=ppt/notesSlides/notesSlide34.xml><?xml version="1.0" encoding="utf-8"?>
 <p:notes xmlns:a="http://schemas.openxmlformats.org/drawingml/2006/main" xmlns:r="http://schemas.openxmlformats.org/officeDocument/2006/relationships" xmlns:p="http://schemas.openxmlformats.org/presentationml/2006/main" showMasterSp="0" showMasterPhAnim="0">
   <p:cSld>
     <p:spTree>
@@ -11246,7 +11280,7 @@
           <p:nvPr>
             <p:extLst>
               <p:ext uri="{D42A27DB-BD31-4B8C-83A1-F6EECF244321}">
-                <p14:modId xmlns:p14="http://schemas.microsoft.com/office/powerpoint/2010/main" val="136595278"/>
+                <p14:modId xmlns:p14="http://schemas.microsoft.com/office/powerpoint/2010/main" val="1587158231"/>
               </p:ext>
             </p:extLst>
           </p:nvPr>
@@ -13212,31 +13246,35 @@
                       <a:r>
                         <a:rPr lang="en-US" altLang="ko-KR" sz="9600" dirty="0">
                           <a:latin typeface="Neo둥근모" panose="02010509060201040203" pitchFamily="1" charset="-127"/>
-                          <a:ea typeface="Neo둥근모" panose="02010509060201040203" pitchFamily="1" charset="-127"/>
+                          <a:ea typeface="Neo둥근모"/>
                         </a:rPr>
                         <a:t>[1]</a:t>
                       </a:r>
                       <a:r>
                         <a:rPr lang="ko-KR" altLang="en-US" sz="9600" dirty="0">
                           <a:latin typeface="Neo둥근모" panose="02010509060201040203" pitchFamily="1" charset="-127"/>
-                          <a:ea typeface="Neo둥근모" panose="02010509060201040203" pitchFamily="1" charset="-127"/>
+                          <a:ea typeface="Neo둥근모"/>
                         </a:rPr>
                         <a:t>이전 </a:t>
                       </a:r>
                       <a:r>
                         <a:rPr lang="en-US" altLang="ko-KR" sz="9600" dirty="0">
                           <a:latin typeface="Neo둥근모" panose="02010509060201040203" pitchFamily="1" charset="-127"/>
-                          <a:ea typeface="Neo둥근모" panose="02010509060201040203" pitchFamily="1" charset="-127"/>
+                          <a:ea typeface="Neo둥근모"/>
                         </a:rPr>
                         <a:t>[2]</a:t>
                       </a:r>
                       <a:r>
                         <a:rPr lang="ko-KR" altLang="en-US" sz="9600" dirty="0">
                           <a:latin typeface="Neo둥근모" panose="02010509060201040203" pitchFamily="1" charset="-127"/>
-                          <a:ea typeface="Neo둥근모" panose="02010509060201040203" pitchFamily="1" charset="-127"/>
+                          <a:ea typeface="Neo둥근모"/>
                         </a:rPr>
                         <a:t>다음</a:t>
                       </a:r>
+                      <a:endParaRPr lang="ko-KR" altLang="en-US" sz="9600" dirty="0">
+                        <a:latin typeface="Neo둥근모" panose="02010509060201040203" pitchFamily="1" charset="-127"/>
+                        <a:ea typeface="Neo둥근모" panose="02010509060201040203" pitchFamily="1" charset="-127"/>
+                      </a:endParaRPr>
                     </a:p>
                   </a:txBody>
                   <a:tcPr marL="0" marR="0" marT="0" marB="0" anchor="b">
@@ -13443,123 +13481,145 @@
             <a:r>
               <a:rPr lang="en-US" altLang="ko-KR" sz="9600" dirty="0">
                 <a:latin typeface="Neo둥근모" panose="02010509060201040203" pitchFamily="1" charset="-127"/>
-                <a:ea typeface="Neo둥근모" panose="02010509060201040203" pitchFamily="1" charset="-127"/>
+                <a:ea typeface="Neo둥근모"/>
               </a:rPr>
               <a:t>2.</a:t>
             </a:r>
             <a:r>
               <a:rPr lang="ko-KR" altLang="en-US" sz="9600" dirty="0" err="1">
                 <a:latin typeface="Neo둥근모" panose="02010509060201040203" pitchFamily="1" charset="-127"/>
-                <a:ea typeface="Neo둥근모" panose="02010509060201040203" pitchFamily="1" charset="-127"/>
+                <a:ea typeface="Neo둥근모"/>
               </a:rPr>
               <a:t>메인관리자</a:t>
             </a:r>
             <a:r>
               <a:rPr lang="ko-KR" altLang="en-US" sz="9600" dirty="0">
                 <a:latin typeface="Neo둥근모" panose="02010509060201040203" pitchFamily="1" charset="-127"/>
-                <a:ea typeface="Neo둥근모" panose="02010509060201040203" pitchFamily="1" charset="-127"/>
+                <a:ea typeface="Neo둥근모"/>
               </a:rPr>
               <a:t> 설정</a:t>
             </a:r>
             <a:endParaRPr lang="en-US" altLang="ko-KR" sz="9600" dirty="0">
+              <a:latin typeface="Neo둥근모" panose="02010509060201040203" pitchFamily="1" charset="-127"/>
+              <a:ea typeface="Neo둥근모"/>
+            </a:endParaRPr>
+          </a:p>
+          <a:p>
+            <a:r>
+              <a:rPr lang="en-US" altLang="ko-KR" sz="9600" dirty="0">
+                <a:solidFill>
+                  <a:schemeClr val="dk1"/>
+                </a:solidFill>
+                <a:latin typeface="Neo둥근모" panose="02010509060201040203" pitchFamily="1" charset="-127"/>
+                <a:ea typeface="Neo둥근모" panose="02010509060201040203" pitchFamily="1" charset="-127"/>
+              </a:rPr>
+              <a:t>1.</a:t>
+            </a:r>
+            <a:r>
+              <a:rPr lang="ko-KR" altLang="en-US" sz="9600" dirty="0">
+                <a:solidFill>
+                  <a:schemeClr val="dk1"/>
+                </a:solidFill>
+                <a:latin typeface="Neo둥근모" panose="02010509060201040203" pitchFamily="1" charset="-127"/>
+                <a:ea typeface="Neo둥근모" panose="02010509060201040203" pitchFamily="1" charset="-127"/>
+              </a:rPr>
+              <a:t>판매정보</a:t>
+            </a:r>
+          </a:p>
+          <a:p>
+            <a:r>
+              <a:rPr lang="en-US" altLang="ko-KR" sz="9600" dirty="0">
+                <a:solidFill>
+                  <a:schemeClr val="dk1"/>
+                </a:solidFill>
+                <a:latin typeface="Neo둥근모" panose="02010509060201040203" pitchFamily="1" charset="-127"/>
+                <a:ea typeface="Neo둥근모" panose="02010509060201040203" pitchFamily="1" charset="-127"/>
+              </a:rPr>
+              <a:t>2.</a:t>
+            </a:r>
+            <a:r>
+              <a:rPr lang="ko-KR" altLang="en-US" sz="9600" dirty="0">
+                <a:solidFill>
+                  <a:schemeClr val="dk1"/>
+                </a:solidFill>
+                <a:latin typeface="Neo둥근모" panose="02010509060201040203" pitchFamily="1" charset="-127"/>
+                <a:ea typeface="Neo둥근모" panose="02010509060201040203" pitchFamily="1" charset="-127"/>
+              </a:rPr>
+              <a:t>상품등록 및 금액설정</a:t>
+            </a:r>
+          </a:p>
+          <a:p>
+            <a:r>
+              <a:rPr lang="en-US" altLang="ko-KR" sz="9600" dirty="0">
+                <a:solidFill>
+                  <a:schemeClr val="dk1"/>
+                </a:solidFill>
+                <a:latin typeface="Neo둥근모" panose="02010509060201040203" pitchFamily="1" charset="-127"/>
+                <a:ea typeface="Neo둥근모" panose="02010509060201040203" pitchFamily="1" charset="-127"/>
+              </a:rPr>
+              <a:t>3.</a:t>
+            </a:r>
+            <a:r>
+              <a:rPr lang="ko-KR" altLang="en-US" sz="9600" dirty="0">
+                <a:solidFill>
+                  <a:schemeClr val="dk1"/>
+                </a:solidFill>
+                <a:latin typeface="Neo둥근모" panose="02010509060201040203" pitchFamily="1" charset="-127"/>
+                <a:ea typeface="Neo둥근모" panose="02010509060201040203" pitchFamily="1" charset="-127"/>
+              </a:rPr>
+              <a:t>동작테스트</a:t>
+            </a:r>
+          </a:p>
+          <a:p>
+            <a:r>
+              <a:rPr lang="en-US" altLang="ko-KR" sz="9600" dirty="0">
+                <a:solidFill>
+                  <a:schemeClr val="dk1"/>
+                </a:solidFill>
+                <a:latin typeface="Neo둥근모" panose="02010509060201040203" pitchFamily="1" charset="-127"/>
+                <a:ea typeface="Neo둥근모"/>
+              </a:rPr>
+              <a:t>4.현재</a:t>
+            </a:r>
+            <a:r>
+              <a:rPr lang="ko-KR" altLang="en-US" sz="9600" dirty="0">
+                <a:solidFill>
+                  <a:schemeClr val="dk1"/>
+                </a:solidFill>
+                <a:latin typeface="Neo둥근모" panose="02010509060201040203" pitchFamily="1" charset="-127"/>
+                <a:ea typeface="Neo둥근모"/>
+              </a:rPr>
+              <a:t>재고등록 리스트</a:t>
+            </a:r>
+          </a:p>
+          <a:p>
+            <a:r>
+              <a:rPr lang="ko-KR" altLang="en-US" sz="9600" dirty="0">
+                <a:solidFill>
+                  <a:schemeClr val="dk1"/>
+                </a:solidFill>
+                <a:latin typeface="Neo둥근모" panose="02010509060201040203" pitchFamily="1" charset="-127"/>
+                <a:ea typeface="Neo둥근모"/>
+              </a:rPr>
+              <a:t>5.</a:t>
+            </a:r>
+            <a:r>
+              <a:rPr lang="ko-KR" sz="9600" dirty="0">
+                <a:solidFill>
+                  <a:schemeClr val="dk1"/>
+                </a:solidFill>
+                <a:latin typeface="Neo둥근모" panose="02010509060201040203" pitchFamily="1" charset="-127"/>
+                <a:ea typeface="Neo둥근모"/>
+              </a:rPr>
+              <a:t>추가재고등록 리스트</a:t>
+            </a:r>
+            <a:endParaRPr lang="ko-KR" altLang="en-US" sz="9600" dirty="0">
+              <a:solidFill>
+                <a:schemeClr val="dk1"/>
+              </a:solidFill>
               <a:latin typeface="Neo둥근모" panose="02010509060201040203" pitchFamily="1" charset="-127"/>
               <a:ea typeface="Neo둥근모" panose="02010509060201040203" pitchFamily="1" charset="-127"/>
             </a:endParaRPr>
-          </a:p>
-          <a:p>
-            <a:pPr algn="ctr"/>
-            <a:endParaRPr lang="ko-KR" altLang="en-US" sz="9600" dirty="0">
-              <a:latin typeface="Neo둥근모" panose="02010509060201040203" pitchFamily="1" charset="-127"/>
-              <a:ea typeface="Neo둥근모" panose="02010509060201040203" pitchFamily="1" charset="-127"/>
-            </a:endParaRPr>
-          </a:p>
-          <a:p>
-            <a:r>
-              <a:rPr lang="en-US" altLang="ko-KR" sz="9600" dirty="0">
-                <a:solidFill>
-                  <a:schemeClr val="dk1"/>
-                </a:solidFill>
-                <a:latin typeface="Neo둥근모" panose="02010509060201040203" pitchFamily="1" charset="-127"/>
-                <a:ea typeface="Neo둥근모" panose="02010509060201040203" pitchFamily="1" charset="-127"/>
-              </a:rPr>
-              <a:t>1.</a:t>
-            </a:r>
-            <a:r>
-              <a:rPr lang="ko-KR" altLang="en-US" sz="9600" dirty="0">
-                <a:solidFill>
-                  <a:schemeClr val="dk1"/>
-                </a:solidFill>
-                <a:latin typeface="Neo둥근모" panose="02010509060201040203" pitchFamily="1" charset="-127"/>
-                <a:ea typeface="Neo둥근모" panose="02010509060201040203" pitchFamily="1" charset="-127"/>
-              </a:rPr>
-              <a:t>판매정보</a:t>
-            </a:r>
-          </a:p>
-          <a:p>
-            <a:r>
-              <a:rPr lang="en-US" altLang="ko-KR" sz="9600" dirty="0">
-                <a:solidFill>
-                  <a:schemeClr val="dk1"/>
-                </a:solidFill>
-                <a:latin typeface="Neo둥근모" panose="02010509060201040203" pitchFamily="1" charset="-127"/>
-                <a:ea typeface="Neo둥근모" panose="02010509060201040203" pitchFamily="1" charset="-127"/>
-              </a:rPr>
-              <a:t>2.</a:t>
-            </a:r>
-            <a:r>
-              <a:rPr lang="ko-KR" altLang="en-US" sz="9600" dirty="0">
-                <a:solidFill>
-                  <a:schemeClr val="dk1"/>
-                </a:solidFill>
-                <a:latin typeface="Neo둥근모" panose="02010509060201040203" pitchFamily="1" charset="-127"/>
-                <a:ea typeface="Neo둥근모" panose="02010509060201040203" pitchFamily="1" charset="-127"/>
-              </a:rPr>
-              <a:t>상품등록 및 금액설정</a:t>
-            </a:r>
-          </a:p>
-          <a:p>
-            <a:r>
-              <a:rPr lang="en-US" altLang="ko-KR" sz="9600" dirty="0">
-                <a:solidFill>
-                  <a:schemeClr val="dk1"/>
-                </a:solidFill>
-                <a:latin typeface="Neo둥근모" panose="02010509060201040203" pitchFamily="1" charset="-127"/>
-                <a:ea typeface="Neo둥근모" panose="02010509060201040203" pitchFamily="1" charset="-127"/>
-              </a:rPr>
-              <a:t>3.</a:t>
-            </a:r>
-            <a:r>
-              <a:rPr lang="ko-KR" altLang="en-US" sz="9600" dirty="0">
-                <a:solidFill>
-                  <a:schemeClr val="dk1"/>
-                </a:solidFill>
-                <a:latin typeface="Neo둥근모" panose="02010509060201040203" pitchFamily="1" charset="-127"/>
-                <a:ea typeface="Neo둥근모" panose="02010509060201040203" pitchFamily="1" charset="-127"/>
-              </a:rPr>
-              <a:t>동작테스트</a:t>
-            </a:r>
-          </a:p>
-          <a:p>
-            <a:r>
-              <a:rPr lang="en-US" altLang="ko-KR" sz="9600" dirty="0">
-                <a:solidFill>
-                  <a:schemeClr val="dk1"/>
-                </a:solidFill>
-                <a:latin typeface="Neo둥근모" panose="02010509060201040203" pitchFamily="1" charset="-127"/>
-                <a:ea typeface="Neo둥근모" panose="02010509060201040203" pitchFamily="1" charset="-127"/>
-              </a:rPr>
-              <a:t>4.</a:t>
-            </a:r>
-            <a:r>
-              <a:rPr lang="ko-KR" altLang="en-US" sz="9600" dirty="0">
-                <a:solidFill>
-                  <a:schemeClr val="dk1"/>
-                </a:solidFill>
-                <a:latin typeface="Neo둥근모" panose="02010509060201040203" pitchFamily="1" charset="-127"/>
-                <a:ea typeface="Neo둥근모" panose="02010509060201040203" pitchFamily="1" charset="-127"/>
-              </a:rPr>
-              <a:t>추가재고등록 리스트</a:t>
-            </a:r>
           </a:p>
         </p:txBody>
       </p:sp>
@@ -13925,7 +13985,7 @@
                   <a:schemeClr val="dk1"/>
                 </a:solidFill>
                 <a:latin typeface="Neo둥근모" panose="02010509060201040203" pitchFamily="1" charset="-127"/>
-                <a:ea typeface="Neo둥근모" panose="02010509060201040203" pitchFamily="1" charset="-127"/>
+                <a:ea typeface="Neo둥근모"/>
               </a:rPr>
               <a:t>[</a:t>
             </a:r>
@@ -13935,7 +13995,7 @@
                   <a:schemeClr val="dk1"/>
                 </a:solidFill>
                 <a:latin typeface="Neo둥근모" panose="02010509060201040203" pitchFamily="1" charset="-127"/>
-                <a:ea typeface="Neo둥근모" panose="02010509060201040203" pitchFamily="1" charset="-127"/>
+                <a:ea typeface="Neo둥근모"/>
               </a:rPr>
               <a:t>결정</a:t>
             </a:r>
@@ -13945,9 +14005,9 @@
                   <a:schemeClr val="dk1"/>
                 </a:solidFill>
                 <a:latin typeface="Neo둥근모" panose="02010509060201040203" pitchFamily="1" charset="-127"/>
-                <a:ea typeface="Neo둥근모" panose="02010509060201040203" pitchFamily="1" charset="-127"/>
-              </a:rPr>
-              <a:t>]3</a:t>
+                <a:ea typeface="Neo둥근모"/>
+              </a:rPr>
+              <a:t>]5</a:t>
             </a:r>
             <a:r>
               <a:rPr lang="ko" altLang="en-US" sz="9600" dirty="0">
@@ -13955,7 +14015,7 @@
                   <a:schemeClr val="dk1"/>
                 </a:solidFill>
                 <a:latin typeface="Neo둥근모" panose="02010509060201040203" pitchFamily="1" charset="-127"/>
-                <a:ea typeface="Neo둥근모" panose="02010509060201040203" pitchFamily="1" charset="-127"/>
+                <a:ea typeface="Neo둥근모"/>
               </a:rPr>
               <a:t>초간 누</a:t>
             </a:r>
@@ -13965,7 +14025,7 @@
                   <a:schemeClr val="dk1"/>
                 </a:solidFill>
                 <a:latin typeface="Neo둥근모" panose="02010509060201040203" pitchFamily="1" charset="-127"/>
-                <a:ea typeface="Neo둥근모" panose="02010509060201040203" pitchFamily="1" charset="-127"/>
+                <a:ea typeface="Neo둥근모"/>
               </a:rPr>
               <a:t>름</a:t>
             </a:r>
@@ -13975,7 +14035,7 @@
                   <a:schemeClr val="dk1"/>
                 </a:solidFill>
                 <a:latin typeface="Neo둥근모" panose="02010509060201040203" pitchFamily="1" charset="-127"/>
-                <a:ea typeface="Neo둥근모" panose="02010509060201040203" pitchFamily="1" charset="-127"/>
+                <a:ea typeface="Neo둥근모"/>
               </a:rPr>
               <a:t> 초기화</a:t>
             </a:r>
@@ -13984,7 +14044,7 @@
                 <a:schemeClr val="dk1"/>
               </a:solidFill>
               <a:latin typeface="Neo둥근모" panose="02010509060201040203" pitchFamily="1" charset="-127"/>
-              <a:ea typeface="Neo둥근모" panose="02010509060201040203" pitchFamily="1" charset="-127"/>
+              <a:ea typeface="Neo둥근모"/>
             </a:endParaRPr>
           </a:p>
           <a:p>
@@ -14760,41 +14820,41 @@
             <a:r>
               <a:rPr lang="en-US" altLang="ko" sz="9600" dirty="0">
                 <a:latin typeface="Neo둥근모" panose="02010509060201040203" pitchFamily="1" charset="-127"/>
-                <a:ea typeface="Neo둥근모" panose="02010509060201040203" pitchFamily="1" charset="-127"/>
-              </a:rPr>
-              <a:t>1.</a:t>
+                <a:ea typeface="Neo둥근모"/>
+              </a:rPr>
+              <a:t>2.</a:t>
             </a:r>
             <a:r>
               <a:rPr lang="ko" altLang="en-US" sz="9600" dirty="0">
                 <a:latin typeface="Neo둥근모" panose="02010509060201040203" pitchFamily="1" charset="-127"/>
-                <a:ea typeface="Neo둥근모" panose="02010509060201040203" pitchFamily="1" charset="-127"/>
+                <a:ea typeface="Neo둥근모"/>
               </a:rPr>
               <a:t>칼럼 테스트 </a:t>
             </a:r>
             <a:r>
               <a:rPr lang="en-US" altLang="ko" sz="9600" dirty="0">
                 <a:latin typeface="Neo둥근모" panose="02010509060201040203" pitchFamily="1" charset="-127"/>
-                <a:ea typeface="Neo둥근모" panose="02010509060201040203" pitchFamily="1" charset="-127"/>
+                <a:ea typeface="Neo둥근모"/>
               </a:rPr>
               <a:t>[</a:t>
             </a:r>
             <a:r>
               <a:rPr lang="ko" altLang="en-US" sz="9600" dirty="0">
                 <a:latin typeface="Neo둥근모" panose="02010509060201040203" pitchFamily="1" charset="-127"/>
-                <a:ea typeface="Neo둥근모" panose="02010509060201040203" pitchFamily="1" charset="-127"/>
+                <a:ea typeface="Neo둥근모"/>
               </a:rPr>
               <a:t>구간</a:t>
             </a:r>
             <a:r>
               <a:rPr lang="en-US" altLang="ko" sz="9600" dirty="0">
                 <a:latin typeface="Neo둥근모" panose="02010509060201040203" pitchFamily="1" charset="-127"/>
-                <a:ea typeface="Neo둥근모" panose="02010509060201040203" pitchFamily="1" charset="-127"/>
+                <a:ea typeface="Neo둥근모"/>
               </a:rPr>
               <a:t>]</a:t>
             </a:r>
             <a:endParaRPr sz="9600" dirty="0">
               <a:latin typeface="Neo둥근모" panose="02010509060201040203" pitchFamily="1" charset="-127"/>
-              <a:ea typeface="Neo둥근모" panose="02010509060201040203" pitchFamily="1" charset="-127"/>
+              <a:ea typeface="Neo둥근모"/>
             </a:endParaRPr>
           </a:p>
           <a:p>
@@ -15039,41 +15099,41 @@
             <a:r>
               <a:rPr lang="en-US" altLang="ko" sz="9600" dirty="0">
                 <a:latin typeface="Neo둥근모" panose="02010509060201040203" pitchFamily="1" charset="-127"/>
-                <a:ea typeface="Neo둥근모" panose="02010509060201040203" pitchFamily="1" charset="-127"/>
-              </a:rPr>
-              <a:t>1.</a:t>
+                <a:ea typeface="Neo둥근모"/>
+              </a:rPr>
+              <a:t>3.</a:t>
             </a:r>
             <a:r>
               <a:rPr lang="ko" altLang="en-US" sz="9600" dirty="0">
                 <a:latin typeface="Neo둥근모" panose="02010509060201040203" pitchFamily="1" charset="-127"/>
-                <a:ea typeface="Neo둥근모" panose="02010509060201040203" pitchFamily="1" charset="-127"/>
+                <a:ea typeface="Neo둥근모"/>
               </a:rPr>
               <a:t>칼럼 테스트 </a:t>
             </a:r>
             <a:r>
               <a:rPr lang="en-US" altLang="ko" sz="9600" dirty="0">
                 <a:latin typeface="Neo둥근모" panose="02010509060201040203" pitchFamily="1" charset="-127"/>
-                <a:ea typeface="Neo둥근모" panose="02010509060201040203" pitchFamily="1" charset="-127"/>
+                <a:ea typeface="Neo둥근모"/>
               </a:rPr>
               <a:t>[</a:t>
             </a:r>
             <a:r>
               <a:rPr lang="ko" altLang="en-US" sz="9600" dirty="0">
                 <a:latin typeface="Neo둥근모" panose="02010509060201040203" pitchFamily="1" charset="-127"/>
-                <a:ea typeface="Neo둥근모" panose="02010509060201040203" pitchFamily="1" charset="-127"/>
+                <a:ea typeface="Neo둥근모"/>
               </a:rPr>
               <a:t>전체</a:t>
             </a:r>
             <a:r>
               <a:rPr lang="en-US" altLang="ko" sz="9600" dirty="0">
                 <a:latin typeface="Neo둥근모" panose="02010509060201040203" pitchFamily="1" charset="-127"/>
-                <a:ea typeface="Neo둥근모" panose="02010509060201040203" pitchFamily="1" charset="-127"/>
+                <a:ea typeface="Neo둥근모"/>
               </a:rPr>
               <a:t>]</a:t>
             </a:r>
             <a:endParaRPr sz="9600" dirty="0">
               <a:latin typeface="Neo둥근모" panose="02010509060201040203" pitchFamily="1" charset="-127"/>
-              <a:ea typeface="Neo둥근모" panose="02010509060201040203" pitchFamily="1" charset="-127"/>
+              <a:ea typeface="Neo둥근모"/>
             </a:endParaRPr>
           </a:p>
           <a:p>
@@ -15157,7 +15217,7 @@
           <p:nvPr>
             <p:extLst>
               <p:ext uri="{D42A27DB-BD31-4B8C-83A1-F6EECF244321}">
-                <p14:modId xmlns:p14="http://schemas.microsoft.com/office/powerpoint/2010/main" val="1450464138"/>
+                <p14:modId xmlns:p14="http://schemas.microsoft.com/office/powerpoint/2010/main" val="1929987427"/>
               </p:ext>
             </p:extLst>
           </p:nvPr>
@@ -15230,16 +15290,16 @@
                       <a:r>
                         <a:rPr lang="en-US" altLang="ko-KR" sz="9600" dirty="0">
                           <a:latin typeface="Neo둥근모" panose="02010509060201040203" pitchFamily="1" charset="-127"/>
-                          <a:ea typeface="Neo둥근모" panose="02010509060201040203" pitchFamily="1" charset="-127"/>
+                          <a:ea typeface="Neo둥근모"/>
                         </a:rPr>
-                        <a:t>4.</a:t>
+                        <a:t>4.현재</a:t>
                       </a:r>
                       <a:r>
                         <a:rPr lang="ko-KR" altLang="en-US" sz="9600" dirty="0">
                           <a:latin typeface="Neo둥근모" panose="02010509060201040203" pitchFamily="1" charset="-127"/>
-                          <a:ea typeface="Neo둥근모" panose="02010509060201040203" pitchFamily="1" charset="-127"/>
+                          <a:ea typeface="Neo둥근모"/>
                         </a:rPr>
-                        <a:t>추가 재고 등록 리스트</a:t>
+                        <a:t> 재고 등록 리스트</a:t>
                       </a:r>
                     </a:p>
                   </a:txBody>
@@ -15390,16 +15450,12 @@
                         </a:lnSpc>
                       </a:pPr>
                       <a:r>
-                        <a:rPr lang="ko-KR" altLang="en-US" sz="9600" dirty="0" smtClean="0">
+                        <a:rPr lang="ko-KR" altLang="en-US" sz="9600" dirty="0">
                           <a:latin typeface="Neo둥근모" panose="02010509060201040203" pitchFamily="1" charset="-127"/>
                           <a:ea typeface="Neo둥근모" panose="02010509060201040203" pitchFamily="1" charset="-127"/>
                         </a:rPr>
                         <a:t>칼럼</a:t>
                       </a:r>
-                      <a:endParaRPr lang="ko-KR" altLang="en-US" sz="9600" dirty="0">
-                        <a:latin typeface="Neo둥근모" panose="02010509060201040203" pitchFamily="1" charset="-127"/>
-                        <a:ea typeface="Neo둥근모" panose="02010509060201040203" pitchFamily="1" charset="-127"/>
-                      </a:endParaRPr>
                     </a:p>
                   </a:txBody>
                   <a:tcPr marL="0" marR="0" marT="0" marB="0" anchor="b">
@@ -15512,10 +15568,14 @@
                       <a:r>
                         <a:rPr lang="ko-KR" altLang="en-US" sz="9600" dirty="0">
                           <a:latin typeface="Neo둥근모" panose="02010509060201040203" pitchFamily="1" charset="-127"/>
-                          <a:ea typeface="Neo둥근모" panose="02010509060201040203" pitchFamily="1" charset="-127"/>
+                          <a:ea typeface="Neo둥근모"/>
                         </a:rPr>
-                        <a:t>추가</a:t>
+                        <a:t>재고</a:t>
                       </a:r>
+                      <a:endParaRPr lang="ko-KR" altLang="en-US" sz="9600" dirty="0">
+                        <a:latin typeface="Neo둥근모" panose="02010509060201040203" pitchFamily="1" charset="-127"/>
+                        <a:ea typeface="Neo둥근모" panose="02010509060201040203" pitchFamily="1" charset="-127"/>
+                      </a:endParaRPr>
                     </a:p>
                   </a:txBody>
                   <a:tcPr marL="0" marR="0" marT="0" marB="0" anchor="b">
@@ -15568,16 +15628,12 @@
                         </a:lnSpc>
                       </a:pPr>
                       <a:r>
-                        <a:rPr lang="ko-KR" altLang="en-US" sz="9600" dirty="0" smtClean="0">
+                        <a:rPr lang="ko-KR" altLang="en-US" sz="9600" dirty="0">
                           <a:latin typeface="Neo둥근모" panose="02010509060201040203" pitchFamily="1" charset="-127"/>
                           <a:ea typeface="Neo둥근모" panose="02010509060201040203" pitchFamily="1" charset="-127"/>
                         </a:rPr>
                         <a:t>칼럼</a:t>
                       </a:r>
-                      <a:endParaRPr lang="ko-KR" altLang="en-US" sz="9600" dirty="0">
-                        <a:latin typeface="Neo둥근모" panose="02010509060201040203" pitchFamily="1" charset="-127"/>
-                        <a:ea typeface="Neo둥근모" panose="02010509060201040203" pitchFamily="1" charset="-127"/>
-                      </a:endParaRPr>
                     </a:p>
                   </a:txBody>
                   <a:tcPr marL="0" marR="0" marT="0" marB="0" anchor="b">
@@ -15690,10 +15746,14 @@
                       <a:r>
                         <a:rPr lang="ko-KR" altLang="en-US" sz="9600" dirty="0">
                           <a:latin typeface="Neo둥근모" panose="02010509060201040203" pitchFamily="1" charset="-127"/>
-                          <a:ea typeface="Neo둥근모" panose="02010509060201040203" pitchFamily="1" charset="-127"/>
+                          <a:ea typeface="Neo둥근모"/>
                         </a:rPr>
-                        <a:t>추가</a:t>
+                        <a:t>재고</a:t>
                       </a:r>
+                      <a:endParaRPr lang="ko-KR" altLang="en-US" sz="9600" dirty="0">
+                        <a:latin typeface="Neo둥근모" panose="02010509060201040203" pitchFamily="1" charset="-127"/>
+                        <a:ea typeface="Neo둥근모" panose="02010509060201040203" pitchFamily="1" charset="-127"/>
+                      </a:endParaRPr>
                     </a:p>
                   </a:txBody>
                   <a:tcPr marL="0" marR="0" marT="0" marB="0" anchor="b">
@@ -17287,6 +17347,2155 @@
   <p:cSld>
     <p:spTree>
       <p:nvGrpSpPr>
+        <p:cNvPr id="1" name="Shape 199"/>
+        <p:cNvGrpSpPr/>
+        <p:nvPr/>
+      </p:nvGrpSpPr>
+      <p:grpSpPr>
+        <a:xfrm>
+          <a:off x="0" y="0"/>
+          <a:ext cx="0" cy="0"/>
+          <a:chOff x="0" y="0"/>
+          <a:chExt cx="0" cy="0"/>
+        </a:xfrm>
+      </p:grpSpPr>
+      <p:graphicFrame>
+        <p:nvGraphicFramePr>
+          <p:cNvPr id="2" name="표 2">
+            <a:extLst>
+              <a:ext uri="{FF2B5EF4-FFF2-40B4-BE49-F238E27FC236}">
+                <a16:creationId xmlns:a16="http://schemas.microsoft.com/office/drawing/2014/main" id="{CEC8E085-425C-61FC-1E23-A637D5CE5DF6}"/>
+              </a:ext>
+            </a:extLst>
+          </p:cNvPr>
+          <p:cNvGraphicFramePr>
+            <a:graphicFrameLocks noGrp="1"/>
+          </p:cNvGraphicFramePr>
+          <p:nvPr>
+            <p:extLst>
+              <p:ext uri="{D42A27DB-BD31-4B8C-83A1-F6EECF244321}">
+                <p14:modId xmlns:p14="http://schemas.microsoft.com/office/powerpoint/2010/main" val="1242255092"/>
+              </p:ext>
+            </p:extLst>
+          </p:nvPr>
+        </p:nvGraphicFramePr>
+        <p:xfrm>
+          <a:off x="0" y="0"/>
+          <a:ext cx="14630400" cy="9143988"/>
+        </p:xfrm>
+        <a:graphic>
+          <a:graphicData uri="http://schemas.openxmlformats.org/drawingml/2006/table">
+            <a:tbl>
+              <a:tblPr firstRow="1" bandRow="1">
+                <a:tableStyleId>{AFAAB7AC-C777-45AD-BA47-93F9C2883FCE}</a:tableStyleId>
+              </a:tblPr>
+              <a:tblGrid>
+                <a:gridCol w="2438400">
+                  <a:extLst>
+                    <a:ext uri="{9D8B030D-6E8A-4147-A177-3AD203B41FA5}">
+                      <a16:colId xmlns:a16="http://schemas.microsoft.com/office/drawing/2014/main" val="3237557660"/>
+                    </a:ext>
+                  </a:extLst>
+                </a:gridCol>
+                <a:gridCol w="2438400">
+                  <a:extLst>
+                    <a:ext uri="{9D8B030D-6E8A-4147-A177-3AD203B41FA5}">
+                      <a16:colId xmlns:a16="http://schemas.microsoft.com/office/drawing/2014/main" val="1769633574"/>
+                    </a:ext>
+                  </a:extLst>
+                </a:gridCol>
+                <a:gridCol w="2438400">
+                  <a:extLst>
+                    <a:ext uri="{9D8B030D-6E8A-4147-A177-3AD203B41FA5}">
+                      <a16:colId xmlns:a16="http://schemas.microsoft.com/office/drawing/2014/main" val="2841950116"/>
+                    </a:ext>
+                  </a:extLst>
+                </a:gridCol>
+                <a:gridCol w="2438400">
+                  <a:extLst>
+                    <a:ext uri="{9D8B030D-6E8A-4147-A177-3AD203B41FA5}">
+                      <a16:colId xmlns:a16="http://schemas.microsoft.com/office/drawing/2014/main" val="1131669113"/>
+                    </a:ext>
+                  </a:extLst>
+                </a:gridCol>
+                <a:gridCol w="2438400">
+                  <a:extLst>
+                    <a:ext uri="{9D8B030D-6E8A-4147-A177-3AD203B41FA5}">
+                      <a16:colId xmlns:a16="http://schemas.microsoft.com/office/drawing/2014/main" val="197271522"/>
+                    </a:ext>
+                  </a:extLst>
+                </a:gridCol>
+                <a:gridCol w="2438400">
+                  <a:extLst>
+                    <a:ext uri="{9D8B030D-6E8A-4147-A177-3AD203B41FA5}">
+                      <a16:colId xmlns:a16="http://schemas.microsoft.com/office/drawing/2014/main" val="942972083"/>
+                    </a:ext>
+                  </a:extLst>
+                </a:gridCol>
+              </a:tblGrid>
+              <a:tr h="1306284">
+                <a:tc gridSpan="6">
+                  <a:txBody>
+                    <a:bodyPr/>
+                    <a:lstStyle/>
+                    <a:p>
+                      <a:pPr algn="ctr" latinLnBrk="1">
+                        <a:lnSpc>
+                          <a:spcPct val="80000"/>
+                        </a:lnSpc>
+                      </a:pPr>
+                      <a:r>
+                        <a:rPr lang="en-US" altLang="ko-KR" sz="9600" dirty="0">
+                          <a:latin typeface="Neo둥근모" panose="02010509060201040203" pitchFamily="1" charset="-127"/>
+                          <a:ea typeface="Neo둥근모"/>
+                        </a:rPr>
+                        <a:t>5.</a:t>
+                      </a:r>
+                      <a:r>
+                        <a:rPr lang="ko-KR" altLang="en-US" sz="9600" dirty="0">
+                          <a:latin typeface="Neo둥근모" panose="02010509060201040203" pitchFamily="1" charset="-127"/>
+                          <a:ea typeface="Neo둥근모"/>
+                        </a:rPr>
+                        <a:t>추가 재고 등록 리스트</a:t>
+                      </a:r>
+                    </a:p>
+                  </a:txBody>
+                  <a:tcPr marL="0" marR="0" marT="0" marB="0" anchor="b">
+                    <a:lnL w="76200" cap="flat" cmpd="sng" algn="ctr">
+                      <a:solidFill>
+                        <a:schemeClr val="tx1"/>
+                      </a:solidFill>
+                      <a:prstDash val="solid"/>
+                      <a:round/>
+                      <a:headEnd type="none" w="med" len="med"/>
+                      <a:tailEnd type="none" w="med" len="med"/>
+                    </a:lnL>
+                    <a:lnR w="76200" cap="flat" cmpd="sng" algn="ctr">
+                      <a:solidFill>
+                        <a:schemeClr val="tx1"/>
+                      </a:solidFill>
+                      <a:prstDash val="solid"/>
+                      <a:round/>
+                      <a:headEnd type="none" w="med" len="med"/>
+                      <a:tailEnd type="none" w="med" len="med"/>
+                    </a:lnR>
+                    <a:lnT w="76200" cap="flat" cmpd="sng" algn="ctr">
+                      <a:solidFill>
+                        <a:schemeClr val="tx1"/>
+                      </a:solidFill>
+                      <a:prstDash val="solid"/>
+                      <a:round/>
+                      <a:headEnd type="none" w="med" len="med"/>
+                      <a:tailEnd type="none" w="med" len="med"/>
+                    </a:lnT>
+                    <a:lnB w="76200" cap="flat" cmpd="sng" algn="ctr">
+                      <a:solidFill>
+                        <a:schemeClr val="tx1"/>
+                      </a:solidFill>
+                      <a:prstDash val="solid"/>
+                      <a:round/>
+                      <a:headEnd type="none" w="med" len="med"/>
+                      <a:tailEnd type="none" w="med" len="med"/>
+                    </a:lnB>
+                  </a:tcPr>
+                </a:tc>
+                <a:tc hMerge="1">
+                  <a:txBody>
+                    <a:bodyPr/>
+                    <a:lstStyle/>
+                    <a:p>
+                      <a:pPr algn="ctr" latinLnBrk="1">
+                        <a:lnSpc>
+                          <a:spcPct val="80000"/>
+                        </a:lnSpc>
+                      </a:pPr>
+                      <a:endParaRPr lang="ko-KR" altLang="en-US" sz="1600" dirty="0">
+                        <a:latin typeface="Neo둥근모" panose="02010509060201040203" pitchFamily="1" charset="-127"/>
+                        <a:ea typeface="Neo둥근모" panose="02010509060201040203" pitchFamily="1" charset="-127"/>
+                      </a:endParaRPr>
+                    </a:p>
+                  </a:txBody>
+                  <a:tcPr marL="0" marR="0" marT="0" marB="0" anchor="b"/>
+                </a:tc>
+                <a:tc hMerge="1">
+                  <a:txBody>
+                    <a:bodyPr/>
+                    <a:lstStyle/>
+                    <a:p>
+                      <a:pPr algn="ctr" latinLnBrk="1">
+                        <a:lnSpc>
+                          <a:spcPct val="80000"/>
+                        </a:lnSpc>
+                      </a:pPr>
+                      <a:endParaRPr lang="ko-KR" altLang="en-US" sz="1600">
+                        <a:latin typeface="Neo둥근모" panose="02010509060201040203" pitchFamily="1" charset="-127"/>
+                        <a:ea typeface="Neo둥근모" panose="02010509060201040203" pitchFamily="1" charset="-127"/>
+                      </a:endParaRPr>
+                    </a:p>
+                  </a:txBody>
+                  <a:tcPr marL="0" marR="0" marT="0" marB="0" anchor="b"/>
+                </a:tc>
+                <a:tc hMerge="1">
+                  <a:txBody>
+                    <a:bodyPr/>
+                    <a:lstStyle/>
+                    <a:p>
+                      <a:pPr algn="ctr" latinLnBrk="1">
+                        <a:lnSpc>
+                          <a:spcPct val="80000"/>
+                        </a:lnSpc>
+                      </a:pPr>
+                      <a:endParaRPr lang="ko-KR" altLang="en-US" sz="1600" dirty="0">
+                        <a:latin typeface="Neo둥근모" panose="02010509060201040203" pitchFamily="1" charset="-127"/>
+                        <a:ea typeface="Neo둥근모" panose="02010509060201040203" pitchFamily="1" charset="-127"/>
+                      </a:endParaRPr>
+                    </a:p>
+                  </a:txBody>
+                  <a:tcPr marL="0" marR="0" marT="0" marB="0" anchor="b"/>
+                </a:tc>
+                <a:tc hMerge="1">
+                  <a:txBody>
+                    <a:bodyPr/>
+                    <a:lstStyle/>
+                    <a:p>
+                      <a:pPr algn="ctr" latinLnBrk="1">
+                        <a:lnSpc>
+                          <a:spcPct val="80000"/>
+                        </a:lnSpc>
+                      </a:pPr>
+                      <a:endParaRPr lang="ko-KR" altLang="en-US" sz="1600">
+                        <a:latin typeface="Neo둥근모" panose="02010509060201040203" pitchFamily="1" charset="-127"/>
+                        <a:ea typeface="Neo둥근모" panose="02010509060201040203" pitchFamily="1" charset="-127"/>
+                      </a:endParaRPr>
+                    </a:p>
+                  </a:txBody>
+                  <a:tcPr marL="0" marR="0" marT="0" marB="0" anchor="b"/>
+                </a:tc>
+                <a:tc hMerge="1">
+                  <a:txBody>
+                    <a:bodyPr/>
+                    <a:lstStyle/>
+                    <a:p>
+                      <a:pPr algn="ctr" latinLnBrk="1">
+                        <a:lnSpc>
+                          <a:spcPct val="80000"/>
+                        </a:lnSpc>
+                      </a:pPr>
+                      <a:endParaRPr lang="ko-KR" altLang="en-US" sz="1600" dirty="0">
+                        <a:latin typeface="Neo둥근모" panose="02010509060201040203" pitchFamily="1" charset="-127"/>
+                        <a:ea typeface="Neo둥근모" panose="02010509060201040203" pitchFamily="1" charset="-127"/>
+                      </a:endParaRPr>
+                    </a:p>
+                  </a:txBody>
+                  <a:tcPr marL="0" marR="0" marT="0" marB="0" anchor="b"/>
+                </a:tc>
+                <a:extLst>
+                  <a:ext uri="{0D108BD9-81ED-4DB2-BD59-A6C34878D82A}">
+                    <a16:rowId xmlns:a16="http://schemas.microsoft.com/office/drawing/2014/main" val="157028888"/>
+                  </a:ext>
+                </a:extLst>
+              </a:tr>
+              <a:tr h="1306284">
+                <a:tc>
+                  <a:txBody>
+                    <a:bodyPr/>
+                    <a:lstStyle/>
+                    <a:p>
+                      <a:pPr algn="ctr" latinLnBrk="1">
+                        <a:lnSpc>
+                          <a:spcPct val="80000"/>
+                        </a:lnSpc>
+                      </a:pPr>
+                      <a:r>
+                        <a:rPr lang="ko-KR" altLang="en-US" sz="9600" dirty="0">
+                          <a:latin typeface="Neo둥근모" panose="02010509060201040203" pitchFamily="1" charset="-127"/>
+                          <a:ea typeface="Neo둥근모" panose="02010509060201040203" pitchFamily="1" charset="-127"/>
+                        </a:rPr>
+                        <a:t>칼럼</a:t>
+                      </a:r>
+                    </a:p>
+                  </a:txBody>
+                  <a:tcPr marL="0" marR="0" marT="0" marB="0" anchor="b">
+                    <a:lnL w="76200" cap="flat" cmpd="sng" algn="ctr">
+                      <a:solidFill>
+                        <a:schemeClr val="tx1"/>
+                      </a:solidFill>
+                      <a:prstDash val="solid"/>
+                      <a:round/>
+                      <a:headEnd type="none" w="med" len="med"/>
+                      <a:tailEnd type="none" w="med" len="med"/>
+                    </a:lnL>
+                    <a:lnR w="76200" cap="flat" cmpd="sng" algn="ctr">
+                      <a:solidFill>
+                        <a:schemeClr val="tx1"/>
+                      </a:solidFill>
+                      <a:prstDash val="solid"/>
+                      <a:round/>
+                      <a:headEnd type="none" w="med" len="med"/>
+                      <a:tailEnd type="none" w="med" len="med"/>
+                    </a:lnR>
+                    <a:lnT w="76200" cap="flat" cmpd="sng" algn="ctr">
+                      <a:solidFill>
+                        <a:schemeClr val="tx1"/>
+                      </a:solidFill>
+                      <a:prstDash val="solid"/>
+                      <a:round/>
+                      <a:headEnd type="none" w="med" len="med"/>
+                      <a:tailEnd type="none" w="med" len="med"/>
+                    </a:lnT>
+                    <a:lnB w="76200" cap="flat" cmpd="sng" algn="ctr">
+                      <a:solidFill>
+                        <a:schemeClr val="tx1"/>
+                      </a:solidFill>
+                      <a:prstDash val="solid"/>
+                      <a:round/>
+                      <a:headEnd type="none" w="med" len="med"/>
+                      <a:tailEnd type="none" w="med" len="med"/>
+                    </a:lnB>
+                  </a:tcPr>
+                </a:tc>
+                <a:tc>
+                  <a:txBody>
+                    <a:bodyPr/>
+                    <a:lstStyle/>
+                    <a:p>
+                      <a:pPr algn="ctr" latinLnBrk="1">
+                        <a:lnSpc>
+                          <a:spcPct val="80000"/>
+                        </a:lnSpc>
+                      </a:pPr>
+                      <a:r>
+                        <a:rPr lang="ko-KR" altLang="en-US" sz="9600" dirty="0">
+                          <a:latin typeface="Neo둥근모" panose="02010509060201040203" pitchFamily="1" charset="-127"/>
+                          <a:ea typeface="Neo둥근모" panose="02010509060201040203" pitchFamily="1" charset="-127"/>
+                        </a:rPr>
+                        <a:t>금액</a:t>
+                      </a:r>
+                    </a:p>
+                  </a:txBody>
+                  <a:tcPr marL="0" marR="0" marT="0" marB="0" anchor="b">
+                    <a:lnL w="76200" cap="flat" cmpd="sng" algn="ctr">
+                      <a:solidFill>
+                        <a:schemeClr val="tx1"/>
+                      </a:solidFill>
+                      <a:prstDash val="solid"/>
+                      <a:round/>
+                      <a:headEnd type="none" w="med" len="med"/>
+                      <a:tailEnd type="none" w="med" len="med"/>
+                    </a:lnL>
+                    <a:lnR w="76200" cap="flat" cmpd="sng" algn="ctr">
+                      <a:solidFill>
+                        <a:schemeClr val="tx1"/>
+                      </a:solidFill>
+                      <a:prstDash val="solid"/>
+                      <a:round/>
+                      <a:headEnd type="none" w="med" len="med"/>
+                      <a:tailEnd type="none" w="med" len="med"/>
+                    </a:lnR>
+                    <a:lnT w="76200" cap="flat" cmpd="sng" algn="ctr">
+                      <a:solidFill>
+                        <a:schemeClr val="tx1"/>
+                      </a:solidFill>
+                      <a:prstDash val="solid"/>
+                      <a:round/>
+                      <a:headEnd type="none" w="med" len="med"/>
+                      <a:tailEnd type="none" w="med" len="med"/>
+                    </a:lnT>
+                    <a:lnB w="76200" cap="flat" cmpd="sng" algn="ctr">
+                      <a:solidFill>
+                        <a:schemeClr val="tx1"/>
+                      </a:solidFill>
+                      <a:prstDash val="solid"/>
+                      <a:round/>
+                      <a:headEnd type="none" w="med" len="med"/>
+                      <a:tailEnd type="none" w="med" len="med"/>
+                    </a:lnB>
+                  </a:tcPr>
+                </a:tc>
+                <a:tc>
+                  <a:txBody>
+                    <a:bodyPr/>
+                    <a:lstStyle/>
+                    <a:p>
+                      <a:pPr algn="ctr" latinLnBrk="1">
+                        <a:lnSpc>
+                          <a:spcPct val="80000"/>
+                        </a:lnSpc>
+                      </a:pPr>
+                      <a:r>
+                        <a:rPr lang="ko-KR" altLang="en-US" sz="9600" dirty="0">
+                          <a:latin typeface="Neo둥근모" panose="02010509060201040203" pitchFamily="1" charset="-127"/>
+                          <a:ea typeface="Neo둥근모" panose="02010509060201040203" pitchFamily="1" charset="-127"/>
+                        </a:rPr>
+                        <a:t>추가</a:t>
+                      </a:r>
+                    </a:p>
+                  </a:txBody>
+                  <a:tcPr marL="0" marR="0" marT="0" marB="0" anchor="b">
+                    <a:lnL w="76200" cap="flat" cmpd="sng" algn="ctr">
+                      <a:solidFill>
+                        <a:schemeClr val="tx1"/>
+                      </a:solidFill>
+                      <a:prstDash val="solid"/>
+                      <a:round/>
+                      <a:headEnd type="none" w="med" len="med"/>
+                      <a:tailEnd type="none" w="med" len="med"/>
+                    </a:lnL>
+                    <a:lnR w="76200" cap="flat" cmpd="sng" algn="ctr">
+                      <a:solidFill>
+                        <a:schemeClr val="tx1"/>
+                      </a:solidFill>
+                      <a:prstDash val="solid"/>
+                      <a:round/>
+                      <a:headEnd type="none" w="med" len="med"/>
+                      <a:tailEnd type="none" w="med" len="med"/>
+                    </a:lnR>
+                    <a:lnT w="76200" cap="flat" cmpd="sng" algn="ctr">
+                      <a:solidFill>
+                        <a:schemeClr val="tx1"/>
+                      </a:solidFill>
+                      <a:prstDash val="solid"/>
+                      <a:round/>
+                      <a:headEnd type="none" w="med" len="med"/>
+                      <a:tailEnd type="none" w="med" len="med"/>
+                    </a:lnT>
+                    <a:lnB w="76200" cap="flat" cmpd="sng" algn="ctr">
+                      <a:solidFill>
+                        <a:schemeClr val="tx1"/>
+                      </a:solidFill>
+                      <a:prstDash val="solid"/>
+                      <a:round/>
+                      <a:headEnd type="none" w="med" len="med"/>
+                      <a:tailEnd type="none" w="med" len="med"/>
+                    </a:lnB>
+                  </a:tcPr>
+                </a:tc>
+                <a:tc>
+                  <a:txBody>
+                    <a:bodyPr/>
+                    <a:lstStyle/>
+                    <a:p>
+                      <a:pPr algn="ctr" latinLnBrk="1">
+                        <a:lnSpc>
+                          <a:spcPct val="80000"/>
+                        </a:lnSpc>
+                      </a:pPr>
+                      <a:r>
+                        <a:rPr lang="ko-KR" altLang="en-US" sz="9600" dirty="0">
+                          <a:latin typeface="Neo둥근모" panose="02010509060201040203" pitchFamily="1" charset="-127"/>
+                          <a:ea typeface="Neo둥근모" panose="02010509060201040203" pitchFamily="1" charset="-127"/>
+                        </a:rPr>
+                        <a:t>칼럼</a:t>
+                      </a:r>
+                    </a:p>
+                  </a:txBody>
+                  <a:tcPr marL="0" marR="0" marT="0" marB="0" anchor="b">
+                    <a:lnL w="76200" cap="flat" cmpd="sng" algn="ctr">
+                      <a:solidFill>
+                        <a:schemeClr val="tx1"/>
+                      </a:solidFill>
+                      <a:prstDash val="solid"/>
+                      <a:round/>
+                      <a:headEnd type="none" w="med" len="med"/>
+                      <a:tailEnd type="none" w="med" len="med"/>
+                    </a:lnL>
+                    <a:lnR w="76200" cap="flat" cmpd="sng" algn="ctr">
+                      <a:solidFill>
+                        <a:schemeClr val="tx1"/>
+                      </a:solidFill>
+                      <a:prstDash val="solid"/>
+                      <a:round/>
+                      <a:headEnd type="none" w="med" len="med"/>
+                      <a:tailEnd type="none" w="med" len="med"/>
+                    </a:lnR>
+                    <a:lnT w="76200" cap="flat" cmpd="sng" algn="ctr">
+                      <a:solidFill>
+                        <a:schemeClr val="tx1"/>
+                      </a:solidFill>
+                      <a:prstDash val="solid"/>
+                      <a:round/>
+                      <a:headEnd type="none" w="med" len="med"/>
+                      <a:tailEnd type="none" w="med" len="med"/>
+                    </a:lnT>
+                    <a:lnB w="76200" cap="flat" cmpd="sng" algn="ctr">
+                      <a:solidFill>
+                        <a:schemeClr val="tx1"/>
+                      </a:solidFill>
+                      <a:prstDash val="solid"/>
+                      <a:round/>
+                      <a:headEnd type="none" w="med" len="med"/>
+                      <a:tailEnd type="none" w="med" len="med"/>
+                    </a:lnB>
+                  </a:tcPr>
+                </a:tc>
+                <a:tc>
+                  <a:txBody>
+                    <a:bodyPr/>
+                    <a:lstStyle/>
+                    <a:p>
+                      <a:pPr algn="ctr" latinLnBrk="1">
+                        <a:lnSpc>
+                          <a:spcPct val="80000"/>
+                        </a:lnSpc>
+                      </a:pPr>
+                      <a:r>
+                        <a:rPr lang="ko-KR" altLang="en-US" sz="9600" dirty="0">
+                          <a:latin typeface="Neo둥근모" panose="02010509060201040203" pitchFamily="1" charset="-127"/>
+                          <a:ea typeface="Neo둥근모" panose="02010509060201040203" pitchFamily="1" charset="-127"/>
+                        </a:rPr>
+                        <a:t>금액</a:t>
+                      </a:r>
+                    </a:p>
+                  </a:txBody>
+                  <a:tcPr marL="0" marR="0" marT="0" marB="0" anchor="b">
+                    <a:lnL w="76200" cap="flat" cmpd="sng" algn="ctr">
+                      <a:solidFill>
+                        <a:schemeClr val="tx1"/>
+                      </a:solidFill>
+                      <a:prstDash val="solid"/>
+                      <a:round/>
+                      <a:headEnd type="none" w="med" len="med"/>
+                      <a:tailEnd type="none" w="med" len="med"/>
+                    </a:lnL>
+                    <a:lnR w="76200" cap="flat" cmpd="sng" algn="ctr">
+                      <a:solidFill>
+                        <a:schemeClr val="tx1"/>
+                      </a:solidFill>
+                      <a:prstDash val="solid"/>
+                      <a:round/>
+                      <a:headEnd type="none" w="med" len="med"/>
+                      <a:tailEnd type="none" w="med" len="med"/>
+                    </a:lnR>
+                    <a:lnT w="76200" cap="flat" cmpd="sng" algn="ctr">
+                      <a:solidFill>
+                        <a:schemeClr val="tx1"/>
+                      </a:solidFill>
+                      <a:prstDash val="solid"/>
+                      <a:round/>
+                      <a:headEnd type="none" w="med" len="med"/>
+                      <a:tailEnd type="none" w="med" len="med"/>
+                    </a:lnT>
+                    <a:lnB w="76200" cap="flat" cmpd="sng" algn="ctr">
+                      <a:solidFill>
+                        <a:schemeClr val="tx1"/>
+                      </a:solidFill>
+                      <a:prstDash val="solid"/>
+                      <a:round/>
+                      <a:headEnd type="none" w="med" len="med"/>
+                      <a:tailEnd type="none" w="med" len="med"/>
+                    </a:lnB>
+                  </a:tcPr>
+                </a:tc>
+                <a:tc>
+                  <a:txBody>
+                    <a:bodyPr/>
+                    <a:lstStyle/>
+                    <a:p>
+                      <a:pPr algn="ctr" latinLnBrk="1">
+                        <a:lnSpc>
+                          <a:spcPct val="80000"/>
+                        </a:lnSpc>
+                      </a:pPr>
+                      <a:r>
+                        <a:rPr lang="ko-KR" altLang="en-US" sz="9600" dirty="0">
+                          <a:latin typeface="Neo둥근모" panose="02010509060201040203" pitchFamily="1" charset="-127"/>
+                          <a:ea typeface="Neo둥근모" panose="02010509060201040203" pitchFamily="1" charset="-127"/>
+                        </a:rPr>
+                        <a:t>추가</a:t>
+                      </a:r>
+                    </a:p>
+                  </a:txBody>
+                  <a:tcPr marL="0" marR="0" marT="0" marB="0" anchor="b">
+                    <a:lnL w="76200" cap="flat" cmpd="sng" algn="ctr">
+                      <a:solidFill>
+                        <a:schemeClr val="tx1"/>
+                      </a:solidFill>
+                      <a:prstDash val="solid"/>
+                      <a:round/>
+                      <a:headEnd type="none" w="med" len="med"/>
+                      <a:tailEnd type="none" w="med" len="med"/>
+                    </a:lnL>
+                    <a:lnR w="76200" cap="flat" cmpd="sng" algn="ctr">
+                      <a:solidFill>
+                        <a:schemeClr val="tx1"/>
+                      </a:solidFill>
+                      <a:prstDash val="solid"/>
+                      <a:round/>
+                      <a:headEnd type="none" w="med" len="med"/>
+                      <a:tailEnd type="none" w="med" len="med"/>
+                    </a:lnR>
+                    <a:lnT w="76200" cap="flat" cmpd="sng" algn="ctr">
+                      <a:solidFill>
+                        <a:schemeClr val="tx1"/>
+                      </a:solidFill>
+                      <a:prstDash val="solid"/>
+                      <a:round/>
+                      <a:headEnd type="none" w="med" len="med"/>
+                      <a:tailEnd type="none" w="med" len="med"/>
+                    </a:lnT>
+                    <a:lnB w="76200" cap="flat" cmpd="sng" algn="ctr">
+                      <a:solidFill>
+                        <a:schemeClr val="tx1"/>
+                      </a:solidFill>
+                      <a:prstDash val="solid"/>
+                      <a:round/>
+                      <a:headEnd type="none" w="med" len="med"/>
+                      <a:tailEnd type="none" w="med" len="med"/>
+                    </a:lnB>
+                  </a:tcPr>
+                </a:tc>
+                <a:extLst>
+                  <a:ext uri="{0D108BD9-81ED-4DB2-BD59-A6C34878D82A}">
+                    <a16:rowId xmlns:a16="http://schemas.microsoft.com/office/drawing/2014/main" val="312880832"/>
+                  </a:ext>
+                </a:extLst>
+              </a:tr>
+              <a:tr h="1306284">
+                <a:tc>
+                  <a:txBody>
+                    <a:bodyPr/>
+                    <a:lstStyle/>
+                    <a:p>
+                      <a:pPr algn="ctr" latinLnBrk="1">
+                        <a:lnSpc>
+                          <a:spcPct val="80000"/>
+                        </a:lnSpc>
+                      </a:pPr>
+                      <a:endParaRPr lang="ko-KR" altLang="en-US" sz="9600" dirty="0">
+                        <a:latin typeface="Neo둥근모" panose="02010509060201040203" pitchFamily="1" charset="-127"/>
+                        <a:ea typeface="Neo둥근모" panose="02010509060201040203" pitchFamily="1" charset="-127"/>
+                      </a:endParaRPr>
+                    </a:p>
+                  </a:txBody>
+                  <a:tcPr marL="0" marR="0" marT="0" marB="0" anchor="b">
+                    <a:lnL w="76200" cap="flat" cmpd="sng" algn="ctr">
+                      <a:solidFill>
+                        <a:schemeClr val="tx1"/>
+                      </a:solidFill>
+                      <a:prstDash val="solid"/>
+                      <a:round/>
+                      <a:headEnd type="none" w="med" len="med"/>
+                      <a:tailEnd type="none" w="med" len="med"/>
+                    </a:lnL>
+                    <a:lnR w="76200" cap="flat" cmpd="sng" algn="ctr">
+                      <a:solidFill>
+                        <a:schemeClr val="tx1"/>
+                      </a:solidFill>
+                      <a:prstDash val="solid"/>
+                      <a:round/>
+                      <a:headEnd type="none" w="med" len="med"/>
+                      <a:tailEnd type="none" w="med" len="med"/>
+                    </a:lnR>
+                    <a:lnT w="76200" cap="flat" cmpd="sng" algn="ctr">
+                      <a:solidFill>
+                        <a:schemeClr val="tx1"/>
+                      </a:solidFill>
+                      <a:prstDash val="solid"/>
+                      <a:round/>
+                      <a:headEnd type="none" w="med" len="med"/>
+                      <a:tailEnd type="none" w="med" len="med"/>
+                    </a:lnT>
+                    <a:lnB w="76200" cap="flat" cmpd="sng" algn="ctr">
+                      <a:solidFill>
+                        <a:schemeClr val="tx1"/>
+                      </a:solidFill>
+                      <a:prstDash val="solid"/>
+                      <a:round/>
+                      <a:headEnd type="none" w="med" len="med"/>
+                      <a:tailEnd type="none" w="med" len="med"/>
+                    </a:lnB>
+                  </a:tcPr>
+                </a:tc>
+                <a:tc>
+                  <a:txBody>
+                    <a:bodyPr/>
+                    <a:lstStyle/>
+                    <a:p>
+                      <a:pPr algn="ctr" latinLnBrk="1">
+                        <a:lnSpc>
+                          <a:spcPct val="80000"/>
+                        </a:lnSpc>
+                      </a:pPr>
+                      <a:endParaRPr lang="ko-KR" altLang="en-US" sz="9600" dirty="0">
+                        <a:latin typeface="Neo둥근모" panose="02010509060201040203" pitchFamily="1" charset="-127"/>
+                        <a:ea typeface="Neo둥근모" panose="02010509060201040203" pitchFamily="1" charset="-127"/>
+                      </a:endParaRPr>
+                    </a:p>
+                  </a:txBody>
+                  <a:tcPr marL="0" marR="0" marT="0" marB="0" anchor="b">
+                    <a:lnL w="76200" cap="flat" cmpd="sng" algn="ctr">
+                      <a:solidFill>
+                        <a:schemeClr val="tx1"/>
+                      </a:solidFill>
+                      <a:prstDash val="solid"/>
+                      <a:round/>
+                      <a:headEnd type="none" w="med" len="med"/>
+                      <a:tailEnd type="none" w="med" len="med"/>
+                    </a:lnL>
+                    <a:lnR w="76200" cap="flat" cmpd="sng" algn="ctr">
+                      <a:solidFill>
+                        <a:schemeClr val="tx1"/>
+                      </a:solidFill>
+                      <a:prstDash val="solid"/>
+                      <a:round/>
+                      <a:headEnd type="none" w="med" len="med"/>
+                      <a:tailEnd type="none" w="med" len="med"/>
+                    </a:lnR>
+                    <a:lnT w="76200" cap="flat" cmpd="sng" algn="ctr">
+                      <a:solidFill>
+                        <a:schemeClr val="tx1"/>
+                      </a:solidFill>
+                      <a:prstDash val="solid"/>
+                      <a:round/>
+                      <a:headEnd type="none" w="med" len="med"/>
+                      <a:tailEnd type="none" w="med" len="med"/>
+                    </a:lnT>
+                    <a:lnB w="76200" cap="flat" cmpd="sng" algn="ctr">
+                      <a:solidFill>
+                        <a:schemeClr val="tx1"/>
+                      </a:solidFill>
+                      <a:prstDash val="solid"/>
+                      <a:round/>
+                      <a:headEnd type="none" w="med" len="med"/>
+                      <a:tailEnd type="none" w="med" len="med"/>
+                    </a:lnB>
+                  </a:tcPr>
+                </a:tc>
+                <a:tc>
+                  <a:txBody>
+                    <a:bodyPr/>
+                    <a:lstStyle/>
+                    <a:p>
+                      <a:pPr algn="ctr" latinLnBrk="1">
+                        <a:lnSpc>
+                          <a:spcPct val="80000"/>
+                        </a:lnSpc>
+                      </a:pPr>
+                      <a:endParaRPr lang="ko-KR" altLang="en-US" sz="9600" dirty="0">
+                        <a:latin typeface="Neo둥근모" panose="02010509060201040203" pitchFamily="1" charset="-127"/>
+                        <a:ea typeface="Neo둥근모" panose="02010509060201040203" pitchFamily="1" charset="-127"/>
+                      </a:endParaRPr>
+                    </a:p>
+                  </a:txBody>
+                  <a:tcPr marL="0" marR="0" marT="0" marB="0" anchor="b">
+                    <a:lnL w="76200" cap="flat" cmpd="sng" algn="ctr">
+                      <a:solidFill>
+                        <a:schemeClr val="tx1"/>
+                      </a:solidFill>
+                      <a:prstDash val="solid"/>
+                      <a:round/>
+                      <a:headEnd type="none" w="med" len="med"/>
+                      <a:tailEnd type="none" w="med" len="med"/>
+                    </a:lnL>
+                    <a:lnR w="76200" cap="flat" cmpd="sng" algn="ctr">
+                      <a:solidFill>
+                        <a:schemeClr val="tx1"/>
+                      </a:solidFill>
+                      <a:prstDash val="solid"/>
+                      <a:round/>
+                      <a:headEnd type="none" w="med" len="med"/>
+                      <a:tailEnd type="none" w="med" len="med"/>
+                    </a:lnR>
+                    <a:lnT w="76200" cap="flat" cmpd="sng" algn="ctr">
+                      <a:solidFill>
+                        <a:schemeClr val="tx1"/>
+                      </a:solidFill>
+                      <a:prstDash val="solid"/>
+                      <a:round/>
+                      <a:headEnd type="none" w="med" len="med"/>
+                      <a:tailEnd type="none" w="med" len="med"/>
+                    </a:lnT>
+                    <a:lnB w="76200" cap="flat" cmpd="sng" algn="ctr">
+                      <a:solidFill>
+                        <a:schemeClr val="tx1"/>
+                      </a:solidFill>
+                      <a:prstDash val="solid"/>
+                      <a:round/>
+                      <a:headEnd type="none" w="med" len="med"/>
+                      <a:tailEnd type="none" w="med" len="med"/>
+                    </a:lnB>
+                  </a:tcPr>
+                </a:tc>
+                <a:tc>
+                  <a:txBody>
+                    <a:bodyPr/>
+                    <a:lstStyle/>
+                    <a:p>
+                      <a:pPr algn="ctr" latinLnBrk="1">
+                        <a:lnSpc>
+                          <a:spcPct val="80000"/>
+                        </a:lnSpc>
+                      </a:pPr>
+                      <a:endParaRPr lang="ko-KR" altLang="en-US" sz="9600" dirty="0">
+                        <a:latin typeface="Neo둥근모" panose="02010509060201040203" pitchFamily="1" charset="-127"/>
+                        <a:ea typeface="Neo둥근모" panose="02010509060201040203" pitchFamily="1" charset="-127"/>
+                      </a:endParaRPr>
+                    </a:p>
+                  </a:txBody>
+                  <a:tcPr marL="0" marR="0" marT="0" marB="0" anchor="b">
+                    <a:lnL w="76200" cap="flat" cmpd="sng" algn="ctr">
+                      <a:solidFill>
+                        <a:schemeClr val="tx1"/>
+                      </a:solidFill>
+                      <a:prstDash val="solid"/>
+                      <a:round/>
+                      <a:headEnd type="none" w="med" len="med"/>
+                      <a:tailEnd type="none" w="med" len="med"/>
+                    </a:lnL>
+                    <a:lnR w="76200" cap="flat" cmpd="sng" algn="ctr">
+                      <a:solidFill>
+                        <a:schemeClr val="tx1"/>
+                      </a:solidFill>
+                      <a:prstDash val="solid"/>
+                      <a:round/>
+                      <a:headEnd type="none" w="med" len="med"/>
+                      <a:tailEnd type="none" w="med" len="med"/>
+                    </a:lnR>
+                    <a:lnT w="76200" cap="flat" cmpd="sng" algn="ctr">
+                      <a:solidFill>
+                        <a:schemeClr val="tx1"/>
+                      </a:solidFill>
+                      <a:prstDash val="solid"/>
+                      <a:round/>
+                      <a:headEnd type="none" w="med" len="med"/>
+                      <a:tailEnd type="none" w="med" len="med"/>
+                    </a:lnT>
+                    <a:lnB w="76200" cap="flat" cmpd="sng" algn="ctr">
+                      <a:solidFill>
+                        <a:schemeClr val="tx1"/>
+                      </a:solidFill>
+                      <a:prstDash val="solid"/>
+                      <a:round/>
+                      <a:headEnd type="none" w="med" len="med"/>
+                      <a:tailEnd type="none" w="med" len="med"/>
+                    </a:lnB>
+                  </a:tcPr>
+                </a:tc>
+                <a:tc>
+                  <a:txBody>
+                    <a:bodyPr/>
+                    <a:lstStyle/>
+                    <a:p>
+                      <a:pPr algn="ctr" latinLnBrk="1">
+                        <a:lnSpc>
+                          <a:spcPct val="80000"/>
+                        </a:lnSpc>
+                      </a:pPr>
+                      <a:endParaRPr lang="ko-KR" altLang="en-US" sz="9600">
+                        <a:latin typeface="Neo둥근모" panose="02010509060201040203" pitchFamily="1" charset="-127"/>
+                        <a:ea typeface="Neo둥근모" panose="02010509060201040203" pitchFamily="1" charset="-127"/>
+                      </a:endParaRPr>
+                    </a:p>
+                  </a:txBody>
+                  <a:tcPr marL="0" marR="0" marT="0" marB="0" anchor="b">
+                    <a:lnL w="76200" cap="flat" cmpd="sng" algn="ctr">
+                      <a:solidFill>
+                        <a:schemeClr val="tx1"/>
+                      </a:solidFill>
+                      <a:prstDash val="solid"/>
+                      <a:round/>
+                      <a:headEnd type="none" w="med" len="med"/>
+                      <a:tailEnd type="none" w="med" len="med"/>
+                    </a:lnL>
+                    <a:lnR w="76200" cap="flat" cmpd="sng" algn="ctr">
+                      <a:solidFill>
+                        <a:schemeClr val="tx1"/>
+                      </a:solidFill>
+                      <a:prstDash val="solid"/>
+                      <a:round/>
+                      <a:headEnd type="none" w="med" len="med"/>
+                      <a:tailEnd type="none" w="med" len="med"/>
+                    </a:lnR>
+                    <a:lnT w="76200" cap="flat" cmpd="sng" algn="ctr">
+                      <a:solidFill>
+                        <a:schemeClr val="tx1"/>
+                      </a:solidFill>
+                      <a:prstDash val="solid"/>
+                      <a:round/>
+                      <a:headEnd type="none" w="med" len="med"/>
+                      <a:tailEnd type="none" w="med" len="med"/>
+                    </a:lnT>
+                    <a:lnB w="76200" cap="flat" cmpd="sng" algn="ctr">
+                      <a:solidFill>
+                        <a:schemeClr val="tx1"/>
+                      </a:solidFill>
+                      <a:prstDash val="solid"/>
+                      <a:round/>
+                      <a:headEnd type="none" w="med" len="med"/>
+                      <a:tailEnd type="none" w="med" len="med"/>
+                    </a:lnB>
+                  </a:tcPr>
+                </a:tc>
+                <a:tc>
+                  <a:txBody>
+                    <a:bodyPr/>
+                    <a:lstStyle/>
+                    <a:p>
+                      <a:pPr algn="ctr" latinLnBrk="1">
+                        <a:lnSpc>
+                          <a:spcPct val="80000"/>
+                        </a:lnSpc>
+                      </a:pPr>
+                      <a:endParaRPr lang="ko-KR" altLang="en-US" sz="9600" dirty="0">
+                        <a:latin typeface="Neo둥근모" panose="02010509060201040203" pitchFamily="1" charset="-127"/>
+                        <a:ea typeface="Neo둥근모" panose="02010509060201040203" pitchFamily="1" charset="-127"/>
+                      </a:endParaRPr>
+                    </a:p>
+                  </a:txBody>
+                  <a:tcPr marL="0" marR="0" marT="0" marB="0" anchor="b">
+                    <a:lnL w="76200" cap="flat" cmpd="sng" algn="ctr">
+                      <a:solidFill>
+                        <a:schemeClr val="tx1"/>
+                      </a:solidFill>
+                      <a:prstDash val="solid"/>
+                      <a:round/>
+                      <a:headEnd type="none" w="med" len="med"/>
+                      <a:tailEnd type="none" w="med" len="med"/>
+                    </a:lnL>
+                    <a:lnR w="76200" cap="flat" cmpd="sng" algn="ctr">
+                      <a:solidFill>
+                        <a:schemeClr val="tx1"/>
+                      </a:solidFill>
+                      <a:prstDash val="solid"/>
+                      <a:round/>
+                      <a:headEnd type="none" w="med" len="med"/>
+                      <a:tailEnd type="none" w="med" len="med"/>
+                    </a:lnR>
+                    <a:lnT w="76200" cap="flat" cmpd="sng" algn="ctr">
+                      <a:solidFill>
+                        <a:schemeClr val="tx1"/>
+                      </a:solidFill>
+                      <a:prstDash val="solid"/>
+                      <a:round/>
+                      <a:headEnd type="none" w="med" len="med"/>
+                      <a:tailEnd type="none" w="med" len="med"/>
+                    </a:lnT>
+                    <a:lnB w="76200" cap="flat" cmpd="sng" algn="ctr">
+                      <a:solidFill>
+                        <a:schemeClr val="tx1"/>
+                      </a:solidFill>
+                      <a:prstDash val="solid"/>
+                      <a:round/>
+                      <a:headEnd type="none" w="med" len="med"/>
+                      <a:tailEnd type="none" w="med" len="med"/>
+                    </a:lnB>
+                  </a:tcPr>
+                </a:tc>
+                <a:extLst>
+                  <a:ext uri="{0D108BD9-81ED-4DB2-BD59-A6C34878D82A}">
+                    <a16:rowId xmlns:a16="http://schemas.microsoft.com/office/drawing/2014/main" val="2018818302"/>
+                  </a:ext>
+                </a:extLst>
+              </a:tr>
+              <a:tr h="1306284">
+                <a:tc>
+                  <a:txBody>
+                    <a:bodyPr/>
+                    <a:lstStyle/>
+                    <a:p>
+                      <a:pPr algn="ctr" latinLnBrk="1">
+                        <a:lnSpc>
+                          <a:spcPct val="80000"/>
+                        </a:lnSpc>
+                      </a:pPr>
+                      <a:endParaRPr lang="ko-KR" altLang="en-US" sz="9600" dirty="0">
+                        <a:latin typeface="Neo둥근모" panose="02010509060201040203" pitchFamily="1" charset="-127"/>
+                        <a:ea typeface="Neo둥근모" panose="02010509060201040203" pitchFamily="1" charset="-127"/>
+                      </a:endParaRPr>
+                    </a:p>
+                  </a:txBody>
+                  <a:tcPr marL="0" marR="0" marT="0" marB="0" anchor="b">
+                    <a:lnL w="76200" cap="flat" cmpd="sng" algn="ctr">
+                      <a:solidFill>
+                        <a:schemeClr val="tx1"/>
+                      </a:solidFill>
+                      <a:prstDash val="solid"/>
+                      <a:round/>
+                      <a:headEnd type="none" w="med" len="med"/>
+                      <a:tailEnd type="none" w="med" len="med"/>
+                    </a:lnL>
+                    <a:lnR w="76200" cap="flat" cmpd="sng" algn="ctr">
+                      <a:solidFill>
+                        <a:schemeClr val="tx1"/>
+                      </a:solidFill>
+                      <a:prstDash val="solid"/>
+                      <a:round/>
+                      <a:headEnd type="none" w="med" len="med"/>
+                      <a:tailEnd type="none" w="med" len="med"/>
+                    </a:lnR>
+                    <a:lnT w="76200" cap="flat" cmpd="sng" algn="ctr">
+                      <a:solidFill>
+                        <a:schemeClr val="tx1"/>
+                      </a:solidFill>
+                      <a:prstDash val="solid"/>
+                      <a:round/>
+                      <a:headEnd type="none" w="med" len="med"/>
+                      <a:tailEnd type="none" w="med" len="med"/>
+                    </a:lnT>
+                    <a:lnB w="76200" cap="flat" cmpd="sng" algn="ctr">
+                      <a:solidFill>
+                        <a:schemeClr val="tx1"/>
+                      </a:solidFill>
+                      <a:prstDash val="solid"/>
+                      <a:round/>
+                      <a:headEnd type="none" w="med" len="med"/>
+                      <a:tailEnd type="none" w="med" len="med"/>
+                    </a:lnB>
+                  </a:tcPr>
+                </a:tc>
+                <a:tc>
+                  <a:txBody>
+                    <a:bodyPr/>
+                    <a:lstStyle/>
+                    <a:p>
+                      <a:pPr algn="ctr" latinLnBrk="1">
+                        <a:lnSpc>
+                          <a:spcPct val="80000"/>
+                        </a:lnSpc>
+                      </a:pPr>
+                      <a:endParaRPr lang="ko-KR" altLang="en-US" sz="9600" dirty="0">
+                        <a:latin typeface="Neo둥근모" panose="02010509060201040203" pitchFamily="1" charset="-127"/>
+                        <a:ea typeface="Neo둥근모" panose="02010509060201040203" pitchFamily="1" charset="-127"/>
+                      </a:endParaRPr>
+                    </a:p>
+                  </a:txBody>
+                  <a:tcPr marL="0" marR="0" marT="0" marB="0" anchor="b">
+                    <a:lnL w="76200" cap="flat" cmpd="sng" algn="ctr">
+                      <a:solidFill>
+                        <a:schemeClr val="tx1"/>
+                      </a:solidFill>
+                      <a:prstDash val="solid"/>
+                      <a:round/>
+                      <a:headEnd type="none" w="med" len="med"/>
+                      <a:tailEnd type="none" w="med" len="med"/>
+                    </a:lnL>
+                    <a:lnR w="76200" cap="flat" cmpd="sng" algn="ctr">
+                      <a:solidFill>
+                        <a:schemeClr val="tx1"/>
+                      </a:solidFill>
+                      <a:prstDash val="solid"/>
+                      <a:round/>
+                      <a:headEnd type="none" w="med" len="med"/>
+                      <a:tailEnd type="none" w="med" len="med"/>
+                    </a:lnR>
+                    <a:lnT w="76200" cap="flat" cmpd="sng" algn="ctr">
+                      <a:solidFill>
+                        <a:schemeClr val="tx1"/>
+                      </a:solidFill>
+                      <a:prstDash val="solid"/>
+                      <a:round/>
+                      <a:headEnd type="none" w="med" len="med"/>
+                      <a:tailEnd type="none" w="med" len="med"/>
+                    </a:lnT>
+                    <a:lnB w="76200" cap="flat" cmpd="sng" algn="ctr">
+                      <a:solidFill>
+                        <a:schemeClr val="tx1"/>
+                      </a:solidFill>
+                      <a:prstDash val="solid"/>
+                      <a:round/>
+                      <a:headEnd type="none" w="med" len="med"/>
+                      <a:tailEnd type="none" w="med" len="med"/>
+                    </a:lnB>
+                  </a:tcPr>
+                </a:tc>
+                <a:tc>
+                  <a:txBody>
+                    <a:bodyPr/>
+                    <a:lstStyle/>
+                    <a:p>
+                      <a:pPr algn="ctr" latinLnBrk="1">
+                        <a:lnSpc>
+                          <a:spcPct val="80000"/>
+                        </a:lnSpc>
+                      </a:pPr>
+                      <a:endParaRPr lang="ko-KR" altLang="en-US" sz="9600" dirty="0">
+                        <a:latin typeface="Neo둥근모" panose="02010509060201040203" pitchFamily="1" charset="-127"/>
+                        <a:ea typeface="Neo둥근모" panose="02010509060201040203" pitchFamily="1" charset="-127"/>
+                      </a:endParaRPr>
+                    </a:p>
+                  </a:txBody>
+                  <a:tcPr marL="0" marR="0" marT="0" marB="0" anchor="b">
+                    <a:lnL w="76200" cap="flat" cmpd="sng" algn="ctr">
+                      <a:solidFill>
+                        <a:schemeClr val="tx1"/>
+                      </a:solidFill>
+                      <a:prstDash val="solid"/>
+                      <a:round/>
+                      <a:headEnd type="none" w="med" len="med"/>
+                      <a:tailEnd type="none" w="med" len="med"/>
+                    </a:lnL>
+                    <a:lnR w="76200" cap="flat" cmpd="sng" algn="ctr">
+                      <a:solidFill>
+                        <a:schemeClr val="tx1"/>
+                      </a:solidFill>
+                      <a:prstDash val="solid"/>
+                      <a:round/>
+                      <a:headEnd type="none" w="med" len="med"/>
+                      <a:tailEnd type="none" w="med" len="med"/>
+                    </a:lnR>
+                    <a:lnT w="76200" cap="flat" cmpd="sng" algn="ctr">
+                      <a:solidFill>
+                        <a:schemeClr val="tx1"/>
+                      </a:solidFill>
+                      <a:prstDash val="solid"/>
+                      <a:round/>
+                      <a:headEnd type="none" w="med" len="med"/>
+                      <a:tailEnd type="none" w="med" len="med"/>
+                    </a:lnT>
+                    <a:lnB w="76200" cap="flat" cmpd="sng" algn="ctr">
+                      <a:solidFill>
+                        <a:schemeClr val="tx1"/>
+                      </a:solidFill>
+                      <a:prstDash val="solid"/>
+                      <a:round/>
+                      <a:headEnd type="none" w="med" len="med"/>
+                      <a:tailEnd type="none" w="med" len="med"/>
+                    </a:lnB>
+                  </a:tcPr>
+                </a:tc>
+                <a:tc>
+                  <a:txBody>
+                    <a:bodyPr/>
+                    <a:lstStyle/>
+                    <a:p>
+                      <a:pPr algn="ctr" latinLnBrk="1">
+                        <a:lnSpc>
+                          <a:spcPct val="80000"/>
+                        </a:lnSpc>
+                      </a:pPr>
+                      <a:endParaRPr lang="ko-KR" altLang="en-US" sz="9600" dirty="0">
+                        <a:latin typeface="Neo둥근모" panose="02010509060201040203" pitchFamily="1" charset="-127"/>
+                        <a:ea typeface="Neo둥근모" panose="02010509060201040203" pitchFamily="1" charset="-127"/>
+                      </a:endParaRPr>
+                    </a:p>
+                  </a:txBody>
+                  <a:tcPr marL="0" marR="0" marT="0" marB="0" anchor="b">
+                    <a:lnL w="76200" cap="flat" cmpd="sng" algn="ctr">
+                      <a:solidFill>
+                        <a:schemeClr val="tx1"/>
+                      </a:solidFill>
+                      <a:prstDash val="solid"/>
+                      <a:round/>
+                      <a:headEnd type="none" w="med" len="med"/>
+                      <a:tailEnd type="none" w="med" len="med"/>
+                    </a:lnL>
+                    <a:lnR w="76200" cap="flat" cmpd="sng" algn="ctr">
+                      <a:solidFill>
+                        <a:schemeClr val="tx1"/>
+                      </a:solidFill>
+                      <a:prstDash val="solid"/>
+                      <a:round/>
+                      <a:headEnd type="none" w="med" len="med"/>
+                      <a:tailEnd type="none" w="med" len="med"/>
+                    </a:lnR>
+                    <a:lnT w="76200" cap="flat" cmpd="sng" algn="ctr">
+                      <a:solidFill>
+                        <a:schemeClr val="tx1"/>
+                      </a:solidFill>
+                      <a:prstDash val="solid"/>
+                      <a:round/>
+                      <a:headEnd type="none" w="med" len="med"/>
+                      <a:tailEnd type="none" w="med" len="med"/>
+                    </a:lnT>
+                    <a:lnB w="76200" cap="flat" cmpd="sng" algn="ctr">
+                      <a:solidFill>
+                        <a:schemeClr val="tx1"/>
+                      </a:solidFill>
+                      <a:prstDash val="solid"/>
+                      <a:round/>
+                      <a:headEnd type="none" w="med" len="med"/>
+                      <a:tailEnd type="none" w="med" len="med"/>
+                    </a:lnB>
+                  </a:tcPr>
+                </a:tc>
+                <a:tc>
+                  <a:txBody>
+                    <a:bodyPr/>
+                    <a:lstStyle/>
+                    <a:p>
+                      <a:pPr algn="ctr" latinLnBrk="1">
+                        <a:lnSpc>
+                          <a:spcPct val="80000"/>
+                        </a:lnSpc>
+                      </a:pPr>
+                      <a:endParaRPr lang="ko-KR" altLang="en-US" sz="9600" dirty="0">
+                        <a:latin typeface="Neo둥근모" panose="02010509060201040203" pitchFamily="1" charset="-127"/>
+                        <a:ea typeface="Neo둥근모" panose="02010509060201040203" pitchFamily="1" charset="-127"/>
+                      </a:endParaRPr>
+                    </a:p>
+                  </a:txBody>
+                  <a:tcPr marL="0" marR="0" marT="0" marB="0" anchor="b">
+                    <a:lnL w="76200" cap="flat" cmpd="sng" algn="ctr">
+                      <a:solidFill>
+                        <a:schemeClr val="tx1"/>
+                      </a:solidFill>
+                      <a:prstDash val="solid"/>
+                      <a:round/>
+                      <a:headEnd type="none" w="med" len="med"/>
+                      <a:tailEnd type="none" w="med" len="med"/>
+                    </a:lnL>
+                    <a:lnR w="76200" cap="flat" cmpd="sng" algn="ctr">
+                      <a:solidFill>
+                        <a:schemeClr val="tx1"/>
+                      </a:solidFill>
+                      <a:prstDash val="solid"/>
+                      <a:round/>
+                      <a:headEnd type="none" w="med" len="med"/>
+                      <a:tailEnd type="none" w="med" len="med"/>
+                    </a:lnR>
+                    <a:lnT w="76200" cap="flat" cmpd="sng" algn="ctr">
+                      <a:solidFill>
+                        <a:schemeClr val="tx1"/>
+                      </a:solidFill>
+                      <a:prstDash val="solid"/>
+                      <a:round/>
+                      <a:headEnd type="none" w="med" len="med"/>
+                      <a:tailEnd type="none" w="med" len="med"/>
+                    </a:lnT>
+                    <a:lnB w="76200" cap="flat" cmpd="sng" algn="ctr">
+                      <a:solidFill>
+                        <a:schemeClr val="tx1"/>
+                      </a:solidFill>
+                      <a:prstDash val="solid"/>
+                      <a:round/>
+                      <a:headEnd type="none" w="med" len="med"/>
+                      <a:tailEnd type="none" w="med" len="med"/>
+                    </a:lnB>
+                  </a:tcPr>
+                </a:tc>
+                <a:tc>
+                  <a:txBody>
+                    <a:bodyPr/>
+                    <a:lstStyle/>
+                    <a:p>
+                      <a:pPr algn="ctr" latinLnBrk="1">
+                        <a:lnSpc>
+                          <a:spcPct val="80000"/>
+                        </a:lnSpc>
+                      </a:pPr>
+                      <a:endParaRPr lang="ko-KR" altLang="en-US" sz="9600" dirty="0">
+                        <a:latin typeface="Neo둥근모" panose="02010509060201040203" pitchFamily="1" charset="-127"/>
+                        <a:ea typeface="Neo둥근모" panose="02010509060201040203" pitchFamily="1" charset="-127"/>
+                      </a:endParaRPr>
+                    </a:p>
+                  </a:txBody>
+                  <a:tcPr marL="0" marR="0" marT="0" marB="0" anchor="b">
+                    <a:lnL w="76200" cap="flat" cmpd="sng" algn="ctr">
+                      <a:solidFill>
+                        <a:schemeClr val="tx1"/>
+                      </a:solidFill>
+                      <a:prstDash val="solid"/>
+                      <a:round/>
+                      <a:headEnd type="none" w="med" len="med"/>
+                      <a:tailEnd type="none" w="med" len="med"/>
+                    </a:lnL>
+                    <a:lnR w="76200" cap="flat" cmpd="sng" algn="ctr">
+                      <a:solidFill>
+                        <a:schemeClr val="tx1"/>
+                      </a:solidFill>
+                      <a:prstDash val="solid"/>
+                      <a:round/>
+                      <a:headEnd type="none" w="med" len="med"/>
+                      <a:tailEnd type="none" w="med" len="med"/>
+                    </a:lnR>
+                    <a:lnT w="76200" cap="flat" cmpd="sng" algn="ctr">
+                      <a:solidFill>
+                        <a:schemeClr val="tx1"/>
+                      </a:solidFill>
+                      <a:prstDash val="solid"/>
+                      <a:round/>
+                      <a:headEnd type="none" w="med" len="med"/>
+                      <a:tailEnd type="none" w="med" len="med"/>
+                    </a:lnT>
+                    <a:lnB w="76200" cap="flat" cmpd="sng" algn="ctr">
+                      <a:solidFill>
+                        <a:schemeClr val="tx1"/>
+                      </a:solidFill>
+                      <a:prstDash val="solid"/>
+                      <a:round/>
+                      <a:headEnd type="none" w="med" len="med"/>
+                      <a:tailEnd type="none" w="med" len="med"/>
+                    </a:lnB>
+                  </a:tcPr>
+                </a:tc>
+                <a:extLst>
+                  <a:ext uri="{0D108BD9-81ED-4DB2-BD59-A6C34878D82A}">
+                    <a16:rowId xmlns:a16="http://schemas.microsoft.com/office/drawing/2014/main" val="3482521770"/>
+                  </a:ext>
+                </a:extLst>
+              </a:tr>
+              <a:tr h="1306284">
+                <a:tc>
+                  <a:txBody>
+                    <a:bodyPr/>
+                    <a:lstStyle/>
+                    <a:p>
+                      <a:pPr algn="ctr" latinLnBrk="1">
+                        <a:lnSpc>
+                          <a:spcPct val="80000"/>
+                        </a:lnSpc>
+                      </a:pPr>
+                      <a:endParaRPr lang="ko-KR" altLang="en-US" sz="9600" dirty="0">
+                        <a:latin typeface="Neo둥근모" panose="02010509060201040203" pitchFamily="1" charset="-127"/>
+                        <a:ea typeface="Neo둥근모" panose="02010509060201040203" pitchFamily="1" charset="-127"/>
+                      </a:endParaRPr>
+                    </a:p>
+                  </a:txBody>
+                  <a:tcPr marL="0" marR="0" marT="0" marB="0" anchor="b">
+                    <a:lnL w="76200" cap="flat" cmpd="sng" algn="ctr">
+                      <a:solidFill>
+                        <a:schemeClr val="tx1"/>
+                      </a:solidFill>
+                      <a:prstDash val="solid"/>
+                      <a:round/>
+                      <a:headEnd type="none" w="med" len="med"/>
+                      <a:tailEnd type="none" w="med" len="med"/>
+                    </a:lnL>
+                    <a:lnR w="76200" cap="flat" cmpd="sng" algn="ctr">
+                      <a:solidFill>
+                        <a:schemeClr val="tx1"/>
+                      </a:solidFill>
+                      <a:prstDash val="solid"/>
+                      <a:round/>
+                      <a:headEnd type="none" w="med" len="med"/>
+                      <a:tailEnd type="none" w="med" len="med"/>
+                    </a:lnR>
+                    <a:lnT w="76200" cap="flat" cmpd="sng" algn="ctr">
+                      <a:solidFill>
+                        <a:schemeClr val="tx1"/>
+                      </a:solidFill>
+                      <a:prstDash val="solid"/>
+                      <a:round/>
+                      <a:headEnd type="none" w="med" len="med"/>
+                      <a:tailEnd type="none" w="med" len="med"/>
+                    </a:lnT>
+                    <a:lnB w="76200" cap="flat" cmpd="sng" algn="ctr">
+                      <a:solidFill>
+                        <a:schemeClr val="tx1"/>
+                      </a:solidFill>
+                      <a:prstDash val="solid"/>
+                      <a:round/>
+                      <a:headEnd type="none" w="med" len="med"/>
+                      <a:tailEnd type="none" w="med" len="med"/>
+                    </a:lnB>
+                  </a:tcPr>
+                </a:tc>
+                <a:tc>
+                  <a:txBody>
+                    <a:bodyPr/>
+                    <a:lstStyle/>
+                    <a:p>
+                      <a:pPr algn="ctr" latinLnBrk="1">
+                        <a:lnSpc>
+                          <a:spcPct val="80000"/>
+                        </a:lnSpc>
+                      </a:pPr>
+                      <a:endParaRPr lang="ko-KR" altLang="en-US" sz="9600">
+                        <a:latin typeface="Neo둥근모" panose="02010509060201040203" pitchFamily="1" charset="-127"/>
+                        <a:ea typeface="Neo둥근모" panose="02010509060201040203" pitchFamily="1" charset="-127"/>
+                      </a:endParaRPr>
+                    </a:p>
+                  </a:txBody>
+                  <a:tcPr marL="0" marR="0" marT="0" marB="0" anchor="b">
+                    <a:lnL w="76200" cap="flat" cmpd="sng" algn="ctr">
+                      <a:solidFill>
+                        <a:schemeClr val="tx1"/>
+                      </a:solidFill>
+                      <a:prstDash val="solid"/>
+                      <a:round/>
+                      <a:headEnd type="none" w="med" len="med"/>
+                      <a:tailEnd type="none" w="med" len="med"/>
+                    </a:lnL>
+                    <a:lnR w="76200" cap="flat" cmpd="sng" algn="ctr">
+                      <a:solidFill>
+                        <a:schemeClr val="tx1"/>
+                      </a:solidFill>
+                      <a:prstDash val="solid"/>
+                      <a:round/>
+                      <a:headEnd type="none" w="med" len="med"/>
+                      <a:tailEnd type="none" w="med" len="med"/>
+                    </a:lnR>
+                    <a:lnT w="76200" cap="flat" cmpd="sng" algn="ctr">
+                      <a:solidFill>
+                        <a:schemeClr val="tx1"/>
+                      </a:solidFill>
+                      <a:prstDash val="solid"/>
+                      <a:round/>
+                      <a:headEnd type="none" w="med" len="med"/>
+                      <a:tailEnd type="none" w="med" len="med"/>
+                    </a:lnT>
+                    <a:lnB w="76200" cap="flat" cmpd="sng" algn="ctr">
+                      <a:solidFill>
+                        <a:schemeClr val="tx1"/>
+                      </a:solidFill>
+                      <a:prstDash val="solid"/>
+                      <a:round/>
+                      <a:headEnd type="none" w="med" len="med"/>
+                      <a:tailEnd type="none" w="med" len="med"/>
+                    </a:lnB>
+                  </a:tcPr>
+                </a:tc>
+                <a:tc>
+                  <a:txBody>
+                    <a:bodyPr/>
+                    <a:lstStyle/>
+                    <a:p>
+                      <a:pPr algn="ctr" latinLnBrk="1">
+                        <a:lnSpc>
+                          <a:spcPct val="80000"/>
+                        </a:lnSpc>
+                      </a:pPr>
+                      <a:endParaRPr lang="ko-KR" altLang="en-US" sz="9600">
+                        <a:latin typeface="Neo둥근모" panose="02010509060201040203" pitchFamily="1" charset="-127"/>
+                        <a:ea typeface="Neo둥근모" panose="02010509060201040203" pitchFamily="1" charset="-127"/>
+                      </a:endParaRPr>
+                    </a:p>
+                  </a:txBody>
+                  <a:tcPr marL="0" marR="0" marT="0" marB="0" anchor="b">
+                    <a:lnL w="76200" cap="flat" cmpd="sng" algn="ctr">
+                      <a:solidFill>
+                        <a:schemeClr val="tx1"/>
+                      </a:solidFill>
+                      <a:prstDash val="solid"/>
+                      <a:round/>
+                      <a:headEnd type="none" w="med" len="med"/>
+                      <a:tailEnd type="none" w="med" len="med"/>
+                    </a:lnL>
+                    <a:lnR w="76200" cap="flat" cmpd="sng" algn="ctr">
+                      <a:solidFill>
+                        <a:schemeClr val="tx1"/>
+                      </a:solidFill>
+                      <a:prstDash val="solid"/>
+                      <a:round/>
+                      <a:headEnd type="none" w="med" len="med"/>
+                      <a:tailEnd type="none" w="med" len="med"/>
+                    </a:lnR>
+                    <a:lnT w="76200" cap="flat" cmpd="sng" algn="ctr">
+                      <a:solidFill>
+                        <a:schemeClr val="tx1"/>
+                      </a:solidFill>
+                      <a:prstDash val="solid"/>
+                      <a:round/>
+                      <a:headEnd type="none" w="med" len="med"/>
+                      <a:tailEnd type="none" w="med" len="med"/>
+                    </a:lnT>
+                    <a:lnB w="76200" cap="flat" cmpd="sng" algn="ctr">
+                      <a:solidFill>
+                        <a:schemeClr val="tx1"/>
+                      </a:solidFill>
+                      <a:prstDash val="solid"/>
+                      <a:round/>
+                      <a:headEnd type="none" w="med" len="med"/>
+                      <a:tailEnd type="none" w="med" len="med"/>
+                    </a:lnB>
+                  </a:tcPr>
+                </a:tc>
+                <a:tc>
+                  <a:txBody>
+                    <a:bodyPr/>
+                    <a:lstStyle/>
+                    <a:p>
+                      <a:pPr algn="ctr" latinLnBrk="1">
+                        <a:lnSpc>
+                          <a:spcPct val="80000"/>
+                        </a:lnSpc>
+                      </a:pPr>
+                      <a:endParaRPr lang="ko-KR" altLang="en-US" sz="9600" dirty="0">
+                        <a:latin typeface="Neo둥근모" panose="02010509060201040203" pitchFamily="1" charset="-127"/>
+                        <a:ea typeface="Neo둥근모" panose="02010509060201040203" pitchFamily="1" charset="-127"/>
+                      </a:endParaRPr>
+                    </a:p>
+                  </a:txBody>
+                  <a:tcPr marL="0" marR="0" marT="0" marB="0" anchor="b">
+                    <a:lnL w="76200" cap="flat" cmpd="sng" algn="ctr">
+                      <a:solidFill>
+                        <a:schemeClr val="tx1"/>
+                      </a:solidFill>
+                      <a:prstDash val="solid"/>
+                      <a:round/>
+                      <a:headEnd type="none" w="med" len="med"/>
+                      <a:tailEnd type="none" w="med" len="med"/>
+                    </a:lnL>
+                    <a:lnR w="76200" cap="flat" cmpd="sng" algn="ctr">
+                      <a:solidFill>
+                        <a:schemeClr val="tx1"/>
+                      </a:solidFill>
+                      <a:prstDash val="solid"/>
+                      <a:round/>
+                      <a:headEnd type="none" w="med" len="med"/>
+                      <a:tailEnd type="none" w="med" len="med"/>
+                    </a:lnR>
+                    <a:lnT w="76200" cap="flat" cmpd="sng" algn="ctr">
+                      <a:solidFill>
+                        <a:schemeClr val="tx1"/>
+                      </a:solidFill>
+                      <a:prstDash val="solid"/>
+                      <a:round/>
+                      <a:headEnd type="none" w="med" len="med"/>
+                      <a:tailEnd type="none" w="med" len="med"/>
+                    </a:lnT>
+                    <a:lnB w="76200" cap="flat" cmpd="sng" algn="ctr">
+                      <a:solidFill>
+                        <a:schemeClr val="tx1"/>
+                      </a:solidFill>
+                      <a:prstDash val="solid"/>
+                      <a:round/>
+                      <a:headEnd type="none" w="med" len="med"/>
+                      <a:tailEnd type="none" w="med" len="med"/>
+                    </a:lnB>
+                  </a:tcPr>
+                </a:tc>
+                <a:tc>
+                  <a:txBody>
+                    <a:bodyPr/>
+                    <a:lstStyle/>
+                    <a:p>
+                      <a:pPr algn="ctr" latinLnBrk="1">
+                        <a:lnSpc>
+                          <a:spcPct val="80000"/>
+                        </a:lnSpc>
+                      </a:pPr>
+                      <a:endParaRPr lang="ko-KR" altLang="en-US" sz="9600" dirty="0">
+                        <a:latin typeface="Neo둥근모" panose="02010509060201040203" pitchFamily="1" charset="-127"/>
+                        <a:ea typeface="Neo둥근모" panose="02010509060201040203" pitchFamily="1" charset="-127"/>
+                      </a:endParaRPr>
+                    </a:p>
+                  </a:txBody>
+                  <a:tcPr marL="0" marR="0" marT="0" marB="0" anchor="b">
+                    <a:lnL w="76200" cap="flat" cmpd="sng" algn="ctr">
+                      <a:solidFill>
+                        <a:schemeClr val="tx1"/>
+                      </a:solidFill>
+                      <a:prstDash val="solid"/>
+                      <a:round/>
+                      <a:headEnd type="none" w="med" len="med"/>
+                      <a:tailEnd type="none" w="med" len="med"/>
+                    </a:lnL>
+                    <a:lnR w="76200" cap="flat" cmpd="sng" algn="ctr">
+                      <a:solidFill>
+                        <a:schemeClr val="tx1"/>
+                      </a:solidFill>
+                      <a:prstDash val="solid"/>
+                      <a:round/>
+                      <a:headEnd type="none" w="med" len="med"/>
+                      <a:tailEnd type="none" w="med" len="med"/>
+                    </a:lnR>
+                    <a:lnT w="76200" cap="flat" cmpd="sng" algn="ctr">
+                      <a:solidFill>
+                        <a:schemeClr val="tx1"/>
+                      </a:solidFill>
+                      <a:prstDash val="solid"/>
+                      <a:round/>
+                      <a:headEnd type="none" w="med" len="med"/>
+                      <a:tailEnd type="none" w="med" len="med"/>
+                    </a:lnT>
+                    <a:lnB w="76200" cap="flat" cmpd="sng" algn="ctr">
+                      <a:solidFill>
+                        <a:schemeClr val="tx1"/>
+                      </a:solidFill>
+                      <a:prstDash val="solid"/>
+                      <a:round/>
+                      <a:headEnd type="none" w="med" len="med"/>
+                      <a:tailEnd type="none" w="med" len="med"/>
+                    </a:lnB>
+                  </a:tcPr>
+                </a:tc>
+                <a:tc>
+                  <a:txBody>
+                    <a:bodyPr/>
+                    <a:lstStyle/>
+                    <a:p>
+                      <a:pPr algn="ctr" latinLnBrk="1">
+                        <a:lnSpc>
+                          <a:spcPct val="80000"/>
+                        </a:lnSpc>
+                      </a:pPr>
+                      <a:endParaRPr lang="ko-KR" altLang="en-US" sz="9600" dirty="0">
+                        <a:latin typeface="Neo둥근모" panose="02010509060201040203" pitchFamily="1" charset="-127"/>
+                        <a:ea typeface="Neo둥근모" panose="02010509060201040203" pitchFamily="1" charset="-127"/>
+                      </a:endParaRPr>
+                    </a:p>
+                  </a:txBody>
+                  <a:tcPr marL="0" marR="0" marT="0" marB="0" anchor="b">
+                    <a:lnL w="76200" cap="flat" cmpd="sng" algn="ctr">
+                      <a:solidFill>
+                        <a:schemeClr val="tx1"/>
+                      </a:solidFill>
+                      <a:prstDash val="solid"/>
+                      <a:round/>
+                      <a:headEnd type="none" w="med" len="med"/>
+                      <a:tailEnd type="none" w="med" len="med"/>
+                    </a:lnL>
+                    <a:lnR w="76200" cap="flat" cmpd="sng" algn="ctr">
+                      <a:solidFill>
+                        <a:schemeClr val="tx1"/>
+                      </a:solidFill>
+                      <a:prstDash val="solid"/>
+                      <a:round/>
+                      <a:headEnd type="none" w="med" len="med"/>
+                      <a:tailEnd type="none" w="med" len="med"/>
+                    </a:lnR>
+                    <a:lnT w="76200" cap="flat" cmpd="sng" algn="ctr">
+                      <a:solidFill>
+                        <a:schemeClr val="tx1"/>
+                      </a:solidFill>
+                      <a:prstDash val="solid"/>
+                      <a:round/>
+                      <a:headEnd type="none" w="med" len="med"/>
+                      <a:tailEnd type="none" w="med" len="med"/>
+                    </a:lnT>
+                    <a:lnB w="76200" cap="flat" cmpd="sng" algn="ctr">
+                      <a:solidFill>
+                        <a:schemeClr val="tx1"/>
+                      </a:solidFill>
+                      <a:prstDash val="solid"/>
+                      <a:round/>
+                      <a:headEnd type="none" w="med" len="med"/>
+                      <a:tailEnd type="none" w="med" len="med"/>
+                    </a:lnB>
+                  </a:tcPr>
+                </a:tc>
+                <a:extLst>
+                  <a:ext uri="{0D108BD9-81ED-4DB2-BD59-A6C34878D82A}">
+                    <a16:rowId xmlns:a16="http://schemas.microsoft.com/office/drawing/2014/main" val="2229237931"/>
+                  </a:ext>
+                </a:extLst>
+              </a:tr>
+              <a:tr h="1306284">
+                <a:tc>
+                  <a:txBody>
+                    <a:bodyPr/>
+                    <a:lstStyle/>
+                    <a:p>
+                      <a:pPr algn="ctr" latinLnBrk="1">
+                        <a:lnSpc>
+                          <a:spcPct val="80000"/>
+                        </a:lnSpc>
+                      </a:pPr>
+                      <a:endParaRPr lang="ko-KR" altLang="en-US" sz="9600" dirty="0">
+                        <a:latin typeface="Neo둥근모" panose="02010509060201040203" pitchFamily="1" charset="-127"/>
+                        <a:ea typeface="Neo둥근모" panose="02010509060201040203" pitchFamily="1" charset="-127"/>
+                      </a:endParaRPr>
+                    </a:p>
+                  </a:txBody>
+                  <a:tcPr marL="0" marR="0" marT="0" marB="0" anchor="b">
+                    <a:lnL w="76200" cap="flat" cmpd="sng" algn="ctr">
+                      <a:solidFill>
+                        <a:schemeClr val="tx1"/>
+                      </a:solidFill>
+                      <a:prstDash val="solid"/>
+                      <a:round/>
+                      <a:headEnd type="none" w="med" len="med"/>
+                      <a:tailEnd type="none" w="med" len="med"/>
+                    </a:lnL>
+                    <a:lnR w="76200" cap="flat" cmpd="sng" algn="ctr">
+                      <a:solidFill>
+                        <a:schemeClr val="tx1"/>
+                      </a:solidFill>
+                      <a:prstDash val="solid"/>
+                      <a:round/>
+                      <a:headEnd type="none" w="med" len="med"/>
+                      <a:tailEnd type="none" w="med" len="med"/>
+                    </a:lnR>
+                    <a:lnT w="76200" cap="flat" cmpd="sng" algn="ctr">
+                      <a:solidFill>
+                        <a:schemeClr val="tx1"/>
+                      </a:solidFill>
+                      <a:prstDash val="solid"/>
+                      <a:round/>
+                      <a:headEnd type="none" w="med" len="med"/>
+                      <a:tailEnd type="none" w="med" len="med"/>
+                    </a:lnT>
+                    <a:lnB w="76200" cap="flat" cmpd="sng" algn="ctr">
+                      <a:solidFill>
+                        <a:schemeClr val="tx1"/>
+                      </a:solidFill>
+                      <a:prstDash val="solid"/>
+                      <a:round/>
+                      <a:headEnd type="none" w="med" len="med"/>
+                      <a:tailEnd type="none" w="med" len="med"/>
+                    </a:lnB>
+                  </a:tcPr>
+                </a:tc>
+                <a:tc>
+                  <a:txBody>
+                    <a:bodyPr/>
+                    <a:lstStyle/>
+                    <a:p>
+                      <a:pPr algn="ctr" latinLnBrk="1">
+                        <a:lnSpc>
+                          <a:spcPct val="80000"/>
+                        </a:lnSpc>
+                      </a:pPr>
+                      <a:endParaRPr lang="ko-KR" altLang="en-US" sz="9600" dirty="0">
+                        <a:latin typeface="Neo둥근모" panose="02010509060201040203" pitchFamily="1" charset="-127"/>
+                        <a:ea typeface="Neo둥근모" panose="02010509060201040203" pitchFamily="1" charset="-127"/>
+                      </a:endParaRPr>
+                    </a:p>
+                  </a:txBody>
+                  <a:tcPr marL="0" marR="0" marT="0" marB="0" anchor="b">
+                    <a:lnL w="76200" cap="flat" cmpd="sng" algn="ctr">
+                      <a:solidFill>
+                        <a:schemeClr val="tx1"/>
+                      </a:solidFill>
+                      <a:prstDash val="solid"/>
+                      <a:round/>
+                      <a:headEnd type="none" w="med" len="med"/>
+                      <a:tailEnd type="none" w="med" len="med"/>
+                    </a:lnL>
+                    <a:lnR w="76200" cap="flat" cmpd="sng" algn="ctr">
+                      <a:solidFill>
+                        <a:schemeClr val="tx1"/>
+                      </a:solidFill>
+                      <a:prstDash val="solid"/>
+                      <a:round/>
+                      <a:headEnd type="none" w="med" len="med"/>
+                      <a:tailEnd type="none" w="med" len="med"/>
+                    </a:lnR>
+                    <a:lnT w="76200" cap="flat" cmpd="sng" algn="ctr">
+                      <a:solidFill>
+                        <a:schemeClr val="tx1"/>
+                      </a:solidFill>
+                      <a:prstDash val="solid"/>
+                      <a:round/>
+                      <a:headEnd type="none" w="med" len="med"/>
+                      <a:tailEnd type="none" w="med" len="med"/>
+                    </a:lnT>
+                    <a:lnB w="76200" cap="flat" cmpd="sng" algn="ctr">
+                      <a:solidFill>
+                        <a:schemeClr val="tx1"/>
+                      </a:solidFill>
+                      <a:prstDash val="solid"/>
+                      <a:round/>
+                      <a:headEnd type="none" w="med" len="med"/>
+                      <a:tailEnd type="none" w="med" len="med"/>
+                    </a:lnB>
+                  </a:tcPr>
+                </a:tc>
+                <a:tc>
+                  <a:txBody>
+                    <a:bodyPr/>
+                    <a:lstStyle/>
+                    <a:p>
+                      <a:pPr algn="ctr" latinLnBrk="1">
+                        <a:lnSpc>
+                          <a:spcPct val="80000"/>
+                        </a:lnSpc>
+                      </a:pPr>
+                      <a:endParaRPr lang="ko-KR" altLang="en-US" sz="9600" dirty="0">
+                        <a:latin typeface="Neo둥근모" panose="02010509060201040203" pitchFamily="1" charset="-127"/>
+                        <a:ea typeface="Neo둥근모" panose="02010509060201040203" pitchFamily="1" charset="-127"/>
+                      </a:endParaRPr>
+                    </a:p>
+                  </a:txBody>
+                  <a:tcPr marL="0" marR="0" marT="0" marB="0" anchor="b">
+                    <a:lnL w="76200" cap="flat" cmpd="sng" algn="ctr">
+                      <a:solidFill>
+                        <a:schemeClr val="tx1"/>
+                      </a:solidFill>
+                      <a:prstDash val="solid"/>
+                      <a:round/>
+                      <a:headEnd type="none" w="med" len="med"/>
+                      <a:tailEnd type="none" w="med" len="med"/>
+                    </a:lnL>
+                    <a:lnR w="76200" cap="flat" cmpd="sng" algn="ctr">
+                      <a:solidFill>
+                        <a:schemeClr val="tx1"/>
+                      </a:solidFill>
+                      <a:prstDash val="solid"/>
+                      <a:round/>
+                      <a:headEnd type="none" w="med" len="med"/>
+                      <a:tailEnd type="none" w="med" len="med"/>
+                    </a:lnR>
+                    <a:lnT w="76200" cap="flat" cmpd="sng" algn="ctr">
+                      <a:solidFill>
+                        <a:schemeClr val="tx1"/>
+                      </a:solidFill>
+                      <a:prstDash val="solid"/>
+                      <a:round/>
+                      <a:headEnd type="none" w="med" len="med"/>
+                      <a:tailEnd type="none" w="med" len="med"/>
+                    </a:lnT>
+                    <a:lnB w="76200" cap="flat" cmpd="sng" algn="ctr">
+                      <a:solidFill>
+                        <a:schemeClr val="tx1"/>
+                      </a:solidFill>
+                      <a:prstDash val="solid"/>
+                      <a:round/>
+                      <a:headEnd type="none" w="med" len="med"/>
+                      <a:tailEnd type="none" w="med" len="med"/>
+                    </a:lnB>
+                  </a:tcPr>
+                </a:tc>
+                <a:tc>
+                  <a:txBody>
+                    <a:bodyPr/>
+                    <a:lstStyle/>
+                    <a:p>
+                      <a:pPr algn="ctr" latinLnBrk="1">
+                        <a:lnSpc>
+                          <a:spcPct val="80000"/>
+                        </a:lnSpc>
+                      </a:pPr>
+                      <a:endParaRPr lang="ko-KR" altLang="en-US" sz="9600" dirty="0">
+                        <a:latin typeface="Neo둥근모" panose="02010509060201040203" pitchFamily="1" charset="-127"/>
+                        <a:ea typeface="Neo둥근모" panose="02010509060201040203" pitchFamily="1" charset="-127"/>
+                      </a:endParaRPr>
+                    </a:p>
+                  </a:txBody>
+                  <a:tcPr marL="0" marR="0" marT="0" marB="0" anchor="b">
+                    <a:lnL w="76200" cap="flat" cmpd="sng" algn="ctr">
+                      <a:solidFill>
+                        <a:schemeClr val="tx1"/>
+                      </a:solidFill>
+                      <a:prstDash val="solid"/>
+                      <a:round/>
+                      <a:headEnd type="none" w="med" len="med"/>
+                      <a:tailEnd type="none" w="med" len="med"/>
+                    </a:lnL>
+                    <a:lnR w="76200" cap="flat" cmpd="sng" algn="ctr">
+                      <a:solidFill>
+                        <a:schemeClr val="tx1"/>
+                      </a:solidFill>
+                      <a:prstDash val="solid"/>
+                      <a:round/>
+                      <a:headEnd type="none" w="med" len="med"/>
+                      <a:tailEnd type="none" w="med" len="med"/>
+                    </a:lnR>
+                    <a:lnT w="76200" cap="flat" cmpd="sng" algn="ctr">
+                      <a:solidFill>
+                        <a:schemeClr val="tx1"/>
+                      </a:solidFill>
+                      <a:prstDash val="solid"/>
+                      <a:round/>
+                      <a:headEnd type="none" w="med" len="med"/>
+                      <a:tailEnd type="none" w="med" len="med"/>
+                    </a:lnT>
+                    <a:lnB w="76200" cap="flat" cmpd="sng" algn="ctr">
+                      <a:solidFill>
+                        <a:schemeClr val="tx1"/>
+                      </a:solidFill>
+                      <a:prstDash val="solid"/>
+                      <a:round/>
+                      <a:headEnd type="none" w="med" len="med"/>
+                      <a:tailEnd type="none" w="med" len="med"/>
+                    </a:lnB>
+                  </a:tcPr>
+                </a:tc>
+                <a:tc>
+                  <a:txBody>
+                    <a:bodyPr/>
+                    <a:lstStyle/>
+                    <a:p>
+                      <a:pPr algn="ctr" latinLnBrk="1">
+                        <a:lnSpc>
+                          <a:spcPct val="80000"/>
+                        </a:lnSpc>
+                      </a:pPr>
+                      <a:endParaRPr lang="ko-KR" altLang="en-US" sz="9600" dirty="0">
+                        <a:latin typeface="Neo둥근모" panose="02010509060201040203" pitchFamily="1" charset="-127"/>
+                        <a:ea typeface="Neo둥근모" panose="02010509060201040203" pitchFamily="1" charset="-127"/>
+                      </a:endParaRPr>
+                    </a:p>
+                  </a:txBody>
+                  <a:tcPr marL="0" marR="0" marT="0" marB="0" anchor="b">
+                    <a:lnL w="76200" cap="flat" cmpd="sng" algn="ctr">
+                      <a:solidFill>
+                        <a:schemeClr val="tx1"/>
+                      </a:solidFill>
+                      <a:prstDash val="solid"/>
+                      <a:round/>
+                      <a:headEnd type="none" w="med" len="med"/>
+                      <a:tailEnd type="none" w="med" len="med"/>
+                    </a:lnL>
+                    <a:lnR w="76200" cap="flat" cmpd="sng" algn="ctr">
+                      <a:solidFill>
+                        <a:schemeClr val="tx1"/>
+                      </a:solidFill>
+                      <a:prstDash val="solid"/>
+                      <a:round/>
+                      <a:headEnd type="none" w="med" len="med"/>
+                      <a:tailEnd type="none" w="med" len="med"/>
+                    </a:lnR>
+                    <a:lnT w="76200" cap="flat" cmpd="sng" algn="ctr">
+                      <a:solidFill>
+                        <a:schemeClr val="tx1"/>
+                      </a:solidFill>
+                      <a:prstDash val="solid"/>
+                      <a:round/>
+                      <a:headEnd type="none" w="med" len="med"/>
+                      <a:tailEnd type="none" w="med" len="med"/>
+                    </a:lnT>
+                    <a:lnB w="76200" cap="flat" cmpd="sng" algn="ctr">
+                      <a:solidFill>
+                        <a:schemeClr val="tx1"/>
+                      </a:solidFill>
+                      <a:prstDash val="solid"/>
+                      <a:round/>
+                      <a:headEnd type="none" w="med" len="med"/>
+                      <a:tailEnd type="none" w="med" len="med"/>
+                    </a:lnB>
+                  </a:tcPr>
+                </a:tc>
+                <a:tc>
+                  <a:txBody>
+                    <a:bodyPr/>
+                    <a:lstStyle/>
+                    <a:p>
+                      <a:pPr algn="ctr" latinLnBrk="1">
+                        <a:lnSpc>
+                          <a:spcPct val="80000"/>
+                        </a:lnSpc>
+                      </a:pPr>
+                      <a:endParaRPr lang="ko-KR" altLang="en-US" sz="9600" dirty="0">
+                        <a:latin typeface="Neo둥근모" panose="02010509060201040203" pitchFamily="1" charset="-127"/>
+                        <a:ea typeface="Neo둥근모" panose="02010509060201040203" pitchFamily="1" charset="-127"/>
+                      </a:endParaRPr>
+                    </a:p>
+                  </a:txBody>
+                  <a:tcPr marL="0" marR="0" marT="0" marB="0" anchor="b">
+                    <a:lnL w="76200" cap="flat" cmpd="sng" algn="ctr">
+                      <a:solidFill>
+                        <a:schemeClr val="tx1"/>
+                      </a:solidFill>
+                      <a:prstDash val="solid"/>
+                      <a:round/>
+                      <a:headEnd type="none" w="med" len="med"/>
+                      <a:tailEnd type="none" w="med" len="med"/>
+                    </a:lnL>
+                    <a:lnR w="76200" cap="flat" cmpd="sng" algn="ctr">
+                      <a:solidFill>
+                        <a:schemeClr val="tx1"/>
+                      </a:solidFill>
+                      <a:prstDash val="solid"/>
+                      <a:round/>
+                      <a:headEnd type="none" w="med" len="med"/>
+                      <a:tailEnd type="none" w="med" len="med"/>
+                    </a:lnR>
+                    <a:lnT w="76200" cap="flat" cmpd="sng" algn="ctr">
+                      <a:solidFill>
+                        <a:schemeClr val="tx1"/>
+                      </a:solidFill>
+                      <a:prstDash val="solid"/>
+                      <a:round/>
+                      <a:headEnd type="none" w="med" len="med"/>
+                      <a:tailEnd type="none" w="med" len="med"/>
+                    </a:lnT>
+                    <a:lnB w="76200" cap="flat" cmpd="sng" algn="ctr">
+                      <a:solidFill>
+                        <a:schemeClr val="tx1"/>
+                      </a:solidFill>
+                      <a:prstDash val="solid"/>
+                      <a:round/>
+                      <a:headEnd type="none" w="med" len="med"/>
+                      <a:tailEnd type="none" w="med" len="med"/>
+                    </a:lnB>
+                  </a:tcPr>
+                </a:tc>
+                <a:extLst>
+                  <a:ext uri="{0D108BD9-81ED-4DB2-BD59-A6C34878D82A}">
+                    <a16:rowId xmlns:a16="http://schemas.microsoft.com/office/drawing/2014/main" val="472600358"/>
+                  </a:ext>
+                </a:extLst>
+              </a:tr>
+              <a:tr h="1306284">
+                <a:tc gridSpan="6">
+                  <a:txBody>
+                    <a:bodyPr/>
+                    <a:lstStyle/>
+                    <a:p>
+                      <a:pPr algn="ctr" latinLnBrk="1">
+                        <a:lnSpc>
+                          <a:spcPct val="80000"/>
+                        </a:lnSpc>
+                      </a:pPr>
+                      <a:r>
+                        <a:rPr lang="en-US" altLang="ko-KR" sz="9600" dirty="0">
+                          <a:latin typeface="Neo둥근모" panose="02010509060201040203" pitchFamily="1" charset="-127"/>
+                          <a:ea typeface="Neo둥근모" panose="02010509060201040203" pitchFamily="1" charset="-127"/>
+                        </a:rPr>
+                        <a:t>[1]</a:t>
+                      </a:r>
+                      <a:r>
+                        <a:rPr lang="ko-KR" altLang="en-US" sz="9600" dirty="0">
+                          <a:latin typeface="Neo둥근모" panose="02010509060201040203" pitchFamily="1" charset="-127"/>
+                          <a:ea typeface="Neo둥근모" panose="02010509060201040203" pitchFamily="1" charset="-127"/>
+                        </a:rPr>
+                        <a:t>이전 </a:t>
+                      </a:r>
+                      <a:r>
+                        <a:rPr lang="en-US" altLang="ko-KR" sz="9600" dirty="0">
+                          <a:latin typeface="Neo둥근모" panose="02010509060201040203" pitchFamily="1" charset="-127"/>
+                          <a:ea typeface="Neo둥근모" panose="02010509060201040203" pitchFamily="1" charset="-127"/>
+                        </a:rPr>
+                        <a:t>[2]</a:t>
+                      </a:r>
+                      <a:r>
+                        <a:rPr lang="ko-KR" altLang="en-US" sz="9600" dirty="0">
+                          <a:latin typeface="Neo둥근모" panose="02010509060201040203" pitchFamily="1" charset="-127"/>
+                          <a:ea typeface="Neo둥근모" panose="02010509060201040203" pitchFamily="1" charset="-127"/>
+                        </a:rPr>
+                        <a:t>다음</a:t>
+                      </a:r>
+                    </a:p>
+                  </a:txBody>
+                  <a:tcPr marL="0" marR="0" marT="0" marB="0" anchor="b">
+                    <a:lnL w="76200" cap="flat" cmpd="sng" algn="ctr">
+                      <a:solidFill>
+                        <a:schemeClr val="tx1"/>
+                      </a:solidFill>
+                      <a:prstDash val="solid"/>
+                      <a:round/>
+                      <a:headEnd type="none" w="med" len="med"/>
+                      <a:tailEnd type="none" w="med" len="med"/>
+                    </a:lnL>
+                    <a:lnR w="76200" cap="flat" cmpd="sng" algn="ctr">
+                      <a:solidFill>
+                        <a:schemeClr val="tx1"/>
+                      </a:solidFill>
+                      <a:prstDash val="solid"/>
+                      <a:round/>
+                      <a:headEnd type="none" w="med" len="med"/>
+                      <a:tailEnd type="none" w="med" len="med"/>
+                    </a:lnR>
+                    <a:lnT w="76200" cap="flat" cmpd="sng" algn="ctr">
+                      <a:solidFill>
+                        <a:schemeClr val="tx1"/>
+                      </a:solidFill>
+                      <a:prstDash val="solid"/>
+                      <a:round/>
+                      <a:headEnd type="none" w="med" len="med"/>
+                      <a:tailEnd type="none" w="med" len="med"/>
+                    </a:lnT>
+                    <a:lnB w="76200" cap="flat" cmpd="sng" algn="ctr">
+                      <a:solidFill>
+                        <a:schemeClr val="tx1"/>
+                      </a:solidFill>
+                      <a:prstDash val="solid"/>
+                      <a:round/>
+                      <a:headEnd type="none" w="med" len="med"/>
+                      <a:tailEnd type="none" w="med" len="med"/>
+                    </a:lnB>
+                  </a:tcPr>
+                </a:tc>
+                <a:tc hMerge="1">
+                  <a:txBody>
+                    <a:bodyPr/>
+                    <a:lstStyle/>
+                    <a:p>
+                      <a:pPr algn="ctr" latinLnBrk="1">
+                        <a:lnSpc>
+                          <a:spcPct val="80000"/>
+                        </a:lnSpc>
+                      </a:pPr>
+                      <a:endParaRPr lang="ko-KR" altLang="en-US" sz="1600" dirty="0">
+                        <a:latin typeface="Neo둥근모" panose="02010509060201040203" pitchFamily="1" charset="-127"/>
+                        <a:ea typeface="Neo둥근모" panose="02010509060201040203" pitchFamily="1" charset="-127"/>
+                      </a:endParaRPr>
+                    </a:p>
+                  </a:txBody>
+                  <a:tcPr marL="0" marR="0" marT="0" marB="0" anchor="b"/>
+                </a:tc>
+                <a:tc hMerge="1">
+                  <a:txBody>
+                    <a:bodyPr/>
+                    <a:lstStyle/>
+                    <a:p>
+                      <a:pPr algn="ctr" latinLnBrk="1">
+                        <a:lnSpc>
+                          <a:spcPct val="80000"/>
+                        </a:lnSpc>
+                      </a:pPr>
+                      <a:endParaRPr lang="ko-KR" altLang="en-US" sz="1600" dirty="0">
+                        <a:latin typeface="Neo둥근모" panose="02010509060201040203" pitchFamily="1" charset="-127"/>
+                        <a:ea typeface="Neo둥근모" panose="02010509060201040203" pitchFamily="1" charset="-127"/>
+                      </a:endParaRPr>
+                    </a:p>
+                  </a:txBody>
+                  <a:tcPr marL="0" marR="0" marT="0" marB="0" anchor="b"/>
+                </a:tc>
+                <a:tc hMerge="1">
+                  <a:txBody>
+                    <a:bodyPr/>
+                    <a:lstStyle/>
+                    <a:p>
+                      <a:pPr algn="ctr" latinLnBrk="1">
+                        <a:lnSpc>
+                          <a:spcPct val="80000"/>
+                        </a:lnSpc>
+                      </a:pPr>
+                      <a:endParaRPr lang="ko-KR" altLang="en-US" sz="1600" dirty="0">
+                        <a:latin typeface="Neo둥근모" panose="02010509060201040203" pitchFamily="1" charset="-127"/>
+                        <a:ea typeface="Neo둥근모" panose="02010509060201040203" pitchFamily="1" charset="-127"/>
+                      </a:endParaRPr>
+                    </a:p>
+                  </a:txBody>
+                  <a:tcPr marL="0" marR="0" marT="0" marB="0" anchor="b"/>
+                </a:tc>
+                <a:tc hMerge="1">
+                  <a:txBody>
+                    <a:bodyPr/>
+                    <a:lstStyle/>
+                    <a:p>
+                      <a:pPr algn="ctr" latinLnBrk="1">
+                        <a:lnSpc>
+                          <a:spcPct val="80000"/>
+                        </a:lnSpc>
+                      </a:pPr>
+                      <a:endParaRPr lang="ko-KR" altLang="en-US" sz="1600" dirty="0">
+                        <a:latin typeface="Neo둥근모" panose="02010509060201040203" pitchFamily="1" charset="-127"/>
+                        <a:ea typeface="Neo둥근모" panose="02010509060201040203" pitchFamily="1" charset="-127"/>
+                      </a:endParaRPr>
+                    </a:p>
+                  </a:txBody>
+                  <a:tcPr marL="0" marR="0" marT="0" marB="0" anchor="b"/>
+                </a:tc>
+                <a:tc hMerge="1">
+                  <a:txBody>
+                    <a:bodyPr/>
+                    <a:lstStyle/>
+                    <a:p>
+                      <a:pPr algn="ctr" latinLnBrk="1">
+                        <a:lnSpc>
+                          <a:spcPct val="80000"/>
+                        </a:lnSpc>
+                      </a:pPr>
+                      <a:endParaRPr lang="ko-KR" altLang="en-US" sz="1600" dirty="0">
+                        <a:latin typeface="Neo둥근모" panose="02010509060201040203" pitchFamily="1" charset="-127"/>
+                        <a:ea typeface="Neo둥근모" panose="02010509060201040203" pitchFamily="1" charset="-127"/>
+                      </a:endParaRPr>
+                    </a:p>
+                  </a:txBody>
+                  <a:tcPr marL="0" marR="0" marT="0" marB="0" anchor="b"/>
+                </a:tc>
+                <a:extLst>
+                  <a:ext uri="{0D108BD9-81ED-4DB2-BD59-A6C34878D82A}">
+                    <a16:rowId xmlns:a16="http://schemas.microsoft.com/office/drawing/2014/main" val="2908931139"/>
+                  </a:ext>
+                </a:extLst>
+              </a:tr>
+            </a:tbl>
+          </a:graphicData>
+        </a:graphic>
+      </p:graphicFrame>
+    </p:spTree>
+    <p:extLst>
+      <p:ext uri="{BB962C8B-B14F-4D97-AF65-F5344CB8AC3E}">
+        <p14:creationId xmlns:p14="http://schemas.microsoft.com/office/powerpoint/2010/main" val="2510446359"/>
+      </p:ext>
+    </p:extLst>
+  </p:cSld>
+  <p:clrMapOvr>
+    <a:masterClrMapping/>
+  </p:clrMapOvr>
+</p:sld>
+</file>
+
+<file path=ppt/slides/slide33.xml><?xml version="1.0" encoding="utf-8"?>
+<p:sld xmlns:a="http://schemas.openxmlformats.org/drawingml/2006/main" xmlns:r="http://schemas.openxmlformats.org/officeDocument/2006/relationships" xmlns:p="http://schemas.openxmlformats.org/presentationml/2006/main">
+  <p:cSld>
+    <p:spTree>
+      <p:nvGrpSpPr>
         <p:cNvPr id="1" name="Shape 173"/>
         <p:cNvGrpSpPr/>
         <p:nvPr/>
@@ -17490,7 +19699,7 @@
 </p:sld>
 </file>
 
-<file path=ppt/slides/slide33.xml><?xml version="1.0" encoding="utf-8"?>
+<file path=ppt/slides/slide34.xml><?xml version="1.0" encoding="utf-8"?>
 <p:sld xmlns:a="http://schemas.openxmlformats.org/drawingml/2006/main" xmlns:r="http://schemas.openxmlformats.org/officeDocument/2006/relationships" xmlns:p="http://schemas.openxmlformats.org/presentationml/2006/main">
   <p:cSld>
     <p:spTree>
@@ -17963,7 +20172,7 @@
           <a:p>
             <a:pPr algn="ctr"/>
             <a:r>
-              <a:rPr lang="ko-KR" altLang="en-US" sz="19200" dirty="0" smtClean="0">
+              <a:rPr lang="ko-KR" altLang="en-US" sz="19200" dirty="0">
                 <a:solidFill>
                   <a:schemeClr val="bg1"/>
                 </a:solidFill>

</xml_diff>